<commit_message>
Added Build Deck and manifest uses windows stack
</commit_message>
<xml_diff>
--- a/Decks/4-Steeltoe Capabilities.pptx
+++ b/Decks/4-Steeltoe Capabilities.pptx
@@ -5,29 +5,28 @@
     <p:sldMasterId id="2147483659" r:id="rId1"/>
   </p:sldMasterIdLst>
   <p:notesMasterIdLst>
-    <p:notesMasterId r:id="rId22"/>
+    <p:notesMasterId r:id="rId21"/>
   </p:notesMasterIdLst>
   <p:sldIdLst>
     <p:sldId id="256" r:id="rId2"/>
-    <p:sldId id="261" r:id="rId3"/>
-    <p:sldId id="262" r:id="rId4"/>
-    <p:sldId id="263" r:id="rId5"/>
-    <p:sldId id="264" r:id="rId6"/>
-    <p:sldId id="265" r:id="rId7"/>
-    <p:sldId id="266" r:id="rId8"/>
-    <p:sldId id="267" r:id="rId9"/>
-    <p:sldId id="268" r:id="rId10"/>
-    <p:sldId id="269" r:id="rId11"/>
-    <p:sldId id="270" r:id="rId12"/>
-    <p:sldId id="272" r:id="rId13"/>
-    <p:sldId id="274" r:id="rId14"/>
-    <p:sldId id="276" r:id="rId15"/>
-    <p:sldId id="278" r:id="rId16"/>
-    <p:sldId id="279" r:id="rId17"/>
-    <p:sldId id="280" r:id="rId18"/>
-    <p:sldId id="281" r:id="rId19"/>
-    <p:sldId id="282" r:id="rId20"/>
-    <p:sldId id="283" r:id="rId21"/>
+    <p:sldId id="262" r:id="rId3"/>
+    <p:sldId id="263" r:id="rId4"/>
+    <p:sldId id="264" r:id="rId5"/>
+    <p:sldId id="265" r:id="rId6"/>
+    <p:sldId id="266" r:id="rId7"/>
+    <p:sldId id="267" r:id="rId8"/>
+    <p:sldId id="268" r:id="rId9"/>
+    <p:sldId id="269" r:id="rId10"/>
+    <p:sldId id="270" r:id="rId11"/>
+    <p:sldId id="272" r:id="rId12"/>
+    <p:sldId id="274" r:id="rId13"/>
+    <p:sldId id="276" r:id="rId14"/>
+    <p:sldId id="278" r:id="rId15"/>
+    <p:sldId id="279" r:id="rId16"/>
+    <p:sldId id="280" r:id="rId17"/>
+    <p:sldId id="281" r:id="rId18"/>
+    <p:sldId id="282" r:id="rId19"/>
+    <p:sldId id="283" r:id="rId20"/>
   </p:sldIdLst>
   <p:sldSz cx="9144000" cy="5143500" type="screen16x9"/>
   <p:notesSz cx="6858000" cy="9144000"/>
@@ -816,7 +815,7 @@
   <p:cSld>
     <p:spTree>
       <p:nvGrpSpPr>
-        <p:cNvPr id="1" name="Shape 226"/>
+        <p:cNvPr id="1" name="Shape 235"/>
         <p:cNvGrpSpPr/>
         <p:nvPr/>
       </p:nvGrpSpPr>
@@ -830,7 +829,7 @@
       </p:grpSpPr>
       <p:sp>
         <p:nvSpPr>
-          <p:cNvPr id="227" name="Google Shape;227;g1d6e10110d_0_338:notes"/>
+          <p:cNvPr id="236" name="Google Shape;236;g1d6e10110d_0_143:notes"/>
           <p:cNvSpPr>
             <a:spLocks noGrp="1" noRot="1" noChangeAspect="1"/>
           </p:cNvSpPr>
@@ -871,7 +870,7 @@
       </p:sp>
       <p:sp>
         <p:nvSpPr>
-          <p:cNvPr id="228" name="Google Shape;228;g1d6e10110d_0_338:notes"/>
+          <p:cNvPr id="237" name="Google Shape;237;g1d6e10110d_0_143:notes"/>
           <p:cNvSpPr txBox="1">
             <a:spLocks noGrp="1"/>
           </p:cNvSpPr>
@@ -901,9 +900,606 @@
               <a:spcAft>
                 <a:spcPts val="0"/>
               </a:spcAft>
-              <a:buNone/>
-            </a:pPr>
-            <a:endParaRPr/>
+              <a:buClr>
+                <a:schemeClr val="dk1"/>
+              </a:buClr>
+              <a:buSzPts val="1100"/>
+              <a:buFont typeface="Arial"/>
+              <a:buNone/>
+            </a:pPr>
+            <a:r>
+              <a:rPr lang="en">
+                <a:solidFill>
+                  <a:srgbClr val="111111"/>
+                </a:solidFill>
+                <a:highlight>
+                  <a:schemeClr val="lt1"/>
+                </a:highlight>
+              </a:rPr>
+              <a:t>We build on the Configuration API provided by .NET which enables you to pull values from different sources using Configuration Providers. </a:t>
+            </a:r>
+            <a:endParaRPr>
+              <a:solidFill>
+                <a:srgbClr val="111111"/>
+              </a:solidFill>
+              <a:highlight>
+                <a:schemeClr val="lt1"/>
+              </a:highlight>
+            </a:endParaRPr>
+          </a:p>
+          <a:p>
+            <a:pPr marL="0" lvl="0" indent="0" algn="l" rtl="0">
+              <a:spcBef>
+                <a:spcPts val="0"/>
+              </a:spcBef>
+              <a:spcAft>
+                <a:spcPts val="0"/>
+              </a:spcAft>
+              <a:buClr>
+                <a:schemeClr val="dk1"/>
+              </a:buClr>
+              <a:buSzPts val="1100"/>
+              <a:buFont typeface="Arial"/>
+              <a:buNone/>
+            </a:pPr>
+            <a:endParaRPr>
+              <a:solidFill>
+                <a:srgbClr val="111111"/>
+              </a:solidFill>
+              <a:highlight>
+                <a:schemeClr val="lt1"/>
+              </a:highlight>
+            </a:endParaRPr>
+          </a:p>
+          <a:p>
+            <a:pPr marL="0" lvl="0" indent="0" algn="l" rtl="0">
+              <a:spcBef>
+                <a:spcPts val="0"/>
+              </a:spcBef>
+              <a:spcAft>
+                <a:spcPts val="0"/>
+              </a:spcAft>
+              <a:buClr>
+                <a:schemeClr val="dk1"/>
+              </a:buClr>
+              <a:buSzPts val="1100"/>
+              <a:buFont typeface="Arial"/>
+              <a:buNone/>
+            </a:pPr>
+            <a:r>
+              <a:rPr lang="en">
+                <a:solidFill>
+                  <a:srgbClr val="111111"/>
+                </a:solidFill>
+                <a:highlight>
+                  <a:schemeClr val="lt1"/>
+                </a:highlight>
+              </a:rPr>
+              <a:t>Each provider supports reading a set of name-value pairs from a different source location; adding them into a combined multi-level configuration dictionary.</a:t>
+            </a:r>
+            <a:endParaRPr>
+              <a:solidFill>
+                <a:srgbClr val="111111"/>
+              </a:solidFill>
+              <a:highlight>
+                <a:schemeClr val="lt1"/>
+              </a:highlight>
+            </a:endParaRPr>
+          </a:p>
+          <a:p>
+            <a:pPr marL="0" lvl="0" indent="0" algn="l" rtl="0">
+              <a:lnSpc>
+                <a:spcPct val="115000"/>
+              </a:lnSpc>
+              <a:spcBef>
+                <a:spcPts val="1100"/>
+              </a:spcBef>
+              <a:spcAft>
+                <a:spcPts val="0"/>
+              </a:spcAft>
+              <a:buClr>
+                <a:schemeClr val="dk1"/>
+              </a:buClr>
+              <a:buSzPts val="1100"/>
+              <a:buFont typeface="Arial"/>
+              <a:buNone/>
+            </a:pPr>
+            <a:r>
+              <a:rPr lang="en">
+                <a:solidFill>
+                  <a:srgbClr val="111111"/>
+                </a:solidFill>
+                <a:highlight>
+                  <a:schemeClr val="lt1"/>
+                </a:highlight>
+              </a:rPr>
+              <a:t>Out of the box, .NET supports getting configuration from:</a:t>
+            </a:r>
+            <a:endParaRPr>
+              <a:solidFill>
+                <a:srgbClr val="111111"/>
+              </a:solidFill>
+              <a:highlight>
+                <a:schemeClr val="lt1"/>
+              </a:highlight>
+            </a:endParaRPr>
+          </a:p>
+          <a:p>
+            <a:pPr marL="457200" lvl="0" indent="-298450" algn="l" rtl="0">
+              <a:lnSpc>
+                <a:spcPct val="115000"/>
+              </a:lnSpc>
+              <a:spcBef>
+                <a:spcPts val="1100"/>
+              </a:spcBef>
+              <a:spcAft>
+                <a:spcPts val="0"/>
+              </a:spcAft>
+              <a:buClr>
+                <a:srgbClr val="111111"/>
+              </a:buClr>
+              <a:buSzPts val="1100"/>
+              <a:buFont typeface="Arial"/>
+              <a:buChar char="●"/>
+            </a:pPr>
+            <a:r>
+              <a:rPr lang="en">
+                <a:solidFill>
+                  <a:srgbClr val="111111"/>
+                </a:solidFill>
+                <a:highlight>
+                  <a:schemeClr val="lt1"/>
+                </a:highlight>
+              </a:rPr>
+              <a:t>Command-line arguments</a:t>
+            </a:r>
+            <a:endParaRPr>
+              <a:solidFill>
+                <a:srgbClr val="111111"/>
+              </a:solidFill>
+              <a:highlight>
+                <a:schemeClr val="lt1"/>
+              </a:highlight>
+            </a:endParaRPr>
+          </a:p>
+          <a:p>
+            <a:pPr marL="457200" lvl="0" indent="-298450" algn="l" rtl="0">
+              <a:lnSpc>
+                <a:spcPct val="115000"/>
+              </a:lnSpc>
+              <a:spcBef>
+                <a:spcPts val="0"/>
+              </a:spcBef>
+              <a:spcAft>
+                <a:spcPts val="0"/>
+              </a:spcAft>
+              <a:buClr>
+                <a:srgbClr val="111111"/>
+              </a:buClr>
+              <a:buSzPts val="1100"/>
+              <a:buFont typeface="Arial"/>
+              <a:buChar char="●"/>
+            </a:pPr>
+            <a:r>
+              <a:rPr lang="en">
+                <a:solidFill>
+                  <a:srgbClr val="111111"/>
+                </a:solidFill>
+                <a:highlight>
+                  <a:schemeClr val="lt1"/>
+                </a:highlight>
+              </a:rPr>
+              <a:t>File sources (e.g. JSON, XML and INI)</a:t>
+            </a:r>
+            <a:endParaRPr>
+              <a:solidFill>
+                <a:srgbClr val="111111"/>
+              </a:solidFill>
+              <a:highlight>
+                <a:schemeClr val="lt1"/>
+              </a:highlight>
+            </a:endParaRPr>
+          </a:p>
+          <a:p>
+            <a:pPr marL="457200" lvl="0" indent="-298450" algn="l" rtl="0">
+              <a:lnSpc>
+                <a:spcPct val="115000"/>
+              </a:lnSpc>
+              <a:spcBef>
+                <a:spcPts val="0"/>
+              </a:spcBef>
+              <a:spcAft>
+                <a:spcPts val="0"/>
+              </a:spcAft>
+              <a:buClr>
+                <a:srgbClr val="111111"/>
+              </a:buClr>
+              <a:buSzPts val="1100"/>
+              <a:buFont typeface="Arial"/>
+              <a:buChar char="●"/>
+            </a:pPr>
+            <a:r>
+              <a:rPr lang="en">
+                <a:solidFill>
+                  <a:srgbClr val="111111"/>
+                </a:solidFill>
+                <a:highlight>
+                  <a:schemeClr val="lt1"/>
+                </a:highlight>
+              </a:rPr>
+              <a:t>Environment variables</a:t>
+            </a:r>
+            <a:endParaRPr>
+              <a:solidFill>
+                <a:srgbClr val="111111"/>
+              </a:solidFill>
+              <a:highlight>
+                <a:schemeClr val="lt1"/>
+              </a:highlight>
+            </a:endParaRPr>
+          </a:p>
+          <a:p>
+            <a:pPr marL="457200" lvl="0" indent="-298450" algn="l" rtl="0">
+              <a:lnSpc>
+                <a:spcPct val="115000"/>
+              </a:lnSpc>
+              <a:spcBef>
+                <a:spcPts val="0"/>
+              </a:spcBef>
+              <a:spcAft>
+                <a:spcPts val="0"/>
+              </a:spcAft>
+              <a:buClr>
+                <a:srgbClr val="111111"/>
+              </a:buClr>
+              <a:buSzPts val="1100"/>
+              <a:buFont typeface="Arial"/>
+              <a:buChar char="●"/>
+            </a:pPr>
+            <a:r>
+              <a:rPr lang="en">
+                <a:solidFill>
+                  <a:srgbClr val="111111"/>
+                </a:solidFill>
+                <a:highlight>
+                  <a:schemeClr val="lt1"/>
+                </a:highlight>
+              </a:rPr>
+              <a:t>Custom providers</a:t>
+            </a:r>
+            <a:endParaRPr>
+              <a:solidFill>
+                <a:srgbClr val="111111"/>
+              </a:solidFill>
+              <a:highlight>
+                <a:schemeClr val="lt1"/>
+              </a:highlight>
+            </a:endParaRPr>
+          </a:p>
+          <a:p>
+            <a:pPr marL="0" lvl="0" indent="0" algn="l" rtl="0">
+              <a:spcBef>
+                <a:spcPts val="1100"/>
+              </a:spcBef>
+              <a:spcAft>
+                <a:spcPts val="0"/>
+              </a:spcAft>
+              <a:buClr>
+                <a:schemeClr val="dk1"/>
+              </a:buClr>
+              <a:buSzPts val="1100"/>
+              <a:buFont typeface="Arial"/>
+              <a:buNone/>
+            </a:pPr>
+            <a:r>
+              <a:rPr lang="en">
+                <a:solidFill>
+                  <a:srgbClr val="111111"/>
+                </a:solidFill>
+                <a:highlight>
+                  <a:schemeClr val="lt1"/>
+                </a:highlight>
+              </a:rPr>
+              <a:t>Steeltoe adds two additional providers to that list:</a:t>
+            </a:r>
+            <a:endParaRPr>
+              <a:solidFill>
+                <a:srgbClr val="111111"/>
+              </a:solidFill>
+              <a:highlight>
+                <a:schemeClr val="lt1"/>
+              </a:highlight>
+            </a:endParaRPr>
+          </a:p>
+          <a:p>
+            <a:pPr marL="0" lvl="0" indent="0" algn="l" rtl="0">
+              <a:spcBef>
+                <a:spcPts val="0"/>
+              </a:spcBef>
+              <a:spcAft>
+                <a:spcPts val="0"/>
+              </a:spcAft>
+              <a:buClr>
+                <a:schemeClr val="dk1"/>
+              </a:buClr>
+              <a:buSzPts val="1100"/>
+              <a:buFont typeface="Arial"/>
+              <a:buNone/>
+            </a:pPr>
+            <a:endParaRPr>
+              <a:solidFill>
+                <a:srgbClr val="111111"/>
+              </a:solidFill>
+              <a:highlight>
+                <a:schemeClr val="lt1"/>
+              </a:highlight>
+            </a:endParaRPr>
+          </a:p>
+          <a:p>
+            <a:pPr marL="0" lvl="0" indent="0" algn="l" rtl="0">
+              <a:spcBef>
+                <a:spcPts val="0"/>
+              </a:spcBef>
+              <a:spcAft>
+                <a:spcPts val="0"/>
+              </a:spcAft>
+              <a:buClr>
+                <a:schemeClr val="dk1"/>
+              </a:buClr>
+              <a:buSzPts val="1100"/>
+              <a:buFont typeface="Arial"/>
+              <a:buNone/>
+            </a:pPr>
+            <a:r>
+              <a:rPr lang="en" b="1">
+                <a:solidFill>
+                  <a:srgbClr val="111111"/>
+                </a:solidFill>
+                <a:highlight>
+                  <a:schemeClr val="lt1"/>
+                </a:highlight>
+              </a:rPr>
+              <a:t>Cloud Foundry Provider</a:t>
+            </a:r>
+            <a:endParaRPr b="1">
+              <a:solidFill>
+                <a:srgbClr val="111111"/>
+              </a:solidFill>
+              <a:highlight>
+                <a:schemeClr val="lt1"/>
+              </a:highlight>
+            </a:endParaRPr>
+          </a:p>
+          <a:p>
+            <a:pPr marL="0" lvl="0" indent="0" algn="l" rtl="0">
+              <a:spcBef>
+                <a:spcPts val="0"/>
+              </a:spcBef>
+              <a:spcAft>
+                <a:spcPts val="0"/>
+              </a:spcAft>
+              <a:buClr>
+                <a:schemeClr val="dk1"/>
+              </a:buClr>
+              <a:buSzPts val="1100"/>
+              <a:buFont typeface="Arial"/>
+              <a:buNone/>
+            </a:pPr>
+            <a:r>
+              <a:rPr lang="en">
+                <a:solidFill>
+                  <a:srgbClr val="111111"/>
+                </a:solidFill>
+                <a:highlight>
+                  <a:schemeClr val="lt1"/>
+                </a:highlight>
+              </a:rPr>
+              <a:t>This provider enables the standard Cloud Foundry environment variables, VCAP_APPLICATION, VCAP_SERVICES and CF_* to be parsed and accessed as configuration data.</a:t>
+            </a:r>
+            <a:endParaRPr>
+              <a:solidFill>
+                <a:srgbClr val="111111"/>
+              </a:solidFill>
+              <a:highlight>
+                <a:schemeClr val="lt1"/>
+              </a:highlight>
+            </a:endParaRPr>
+          </a:p>
+          <a:p>
+            <a:pPr marL="0" lvl="0" indent="0" algn="l" rtl="0">
+              <a:spcBef>
+                <a:spcPts val="0"/>
+              </a:spcBef>
+              <a:spcAft>
+                <a:spcPts val="0"/>
+              </a:spcAft>
+              <a:buClr>
+                <a:schemeClr val="dk1"/>
+              </a:buClr>
+              <a:buSzPts val="1100"/>
+              <a:buFont typeface="Arial"/>
+              <a:buNone/>
+            </a:pPr>
+            <a:endParaRPr>
+              <a:solidFill>
+                <a:srgbClr val="111111"/>
+              </a:solidFill>
+              <a:highlight>
+                <a:schemeClr val="lt1"/>
+              </a:highlight>
+            </a:endParaRPr>
+          </a:p>
+          <a:p>
+            <a:pPr marL="0" lvl="0" indent="0" algn="l" rtl="0">
+              <a:spcBef>
+                <a:spcPts val="0"/>
+              </a:spcBef>
+              <a:spcAft>
+                <a:spcPts val="0"/>
+              </a:spcAft>
+              <a:buClr>
+                <a:schemeClr val="dk1"/>
+              </a:buClr>
+              <a:buSzPts val="1100"/>
+              <a:buFont typeface="Arial"/>
+              <a:buNone/>
+            </a:pPr>
+            <a:r>
+              <a:rPr lang="en" b="1">
+                <a:solidFill>
+                  <a:srgbClr val="111111"/>
+                </a:solidFill>
+                <a:highlight>
+                  <a:schemeClr val="lt1"/>
+                </a:highlight>
+              </a:rPr>
+              <a:t>Config Server Provider</a:t>
+            </a:r>
+            <a:endParaRPr b="1">
+              <a:solidFill>
+                <a:srgbClr val="111111"/>
+              </a:solidFill>
+              <a:highlight>
+                <a:schemeClr val="lt1"/>
+              </a:highlight>
+            </a:endParaRPr>
+          </a:p>
+          <a:p>
+            <a:pPr marL="0" lvl="0" indent="0" algn="l" rtl="0">
+              <a:spcBef>
+                <a:spcPts val="0"/>
+              </a:spcBef>
+              <a:spcAft>
+                <a:spcPts val="0"/>
+              </a:spcAft>
+              <a:buClr>
+                <a:schemeClr val="dk1"/>
+              </a:buClr>
+              <a:buSzPts val="1100"/>
+              <a:buFont typeface="Arial"/>
+              <a:buNone/>
+            </a:pPr>
+            <a:r>
+              <a:rPr lang="en">
+                <a:solidFill>
+                  <a:srgbClr val="111111"/>
+                </a:solidFill>
+                <a:highlight>
+                  <a:schemeClr val="lt1"/>
+                </a:highlight>
+              </a:rPr>
+              <a:t>This provider enables the Spring Cloud Config Server to be used as a source of configuration data for a .NET application.</a:t>
+            </a:r>
+            <a:endParaRPr>
+              <a:solidFill>
+                <a:srgbClr val="111111"/>
+              </a:solidFill>
+              <a:highlight>
+                <a:schemeClr val="lt1"/>
+              </a:highlight>
+            </a:endParaRPr>
+          </a:p>
+          <a:p>
+            <a:pPr marL="0" lvl="0" indent="0" algn="l" rtl="0">
+              <a:spcBef>
+                <a:spcPts val="0"/>
+              </a:spcBef>
+              <a:spcAft>
+                <a:spcPts val="0"/>
+              </a:spcAft>
+              <a:buClr>
+                <a:schemeClr val="dk1"/>
+              </a:buClr>
+              <a:buSzPts val="1100"/>
+              <a:buFont typeface="Arial"/>
+              <a:buNone/>
+            </a:pPr>
+            <a:endParaRPr>
+              <a:solidFill>
+                <a:srgbClr val="111111"/>
+              </a:solidFill>
+              <a:highlight>
+                <a:schemeClr val="lt1"/>
+              </a:highlight>
+            </a:endParaRPr>
+          </a:p>
+          <a:p>
+            <a:pPr marL="0" lvl="0" indent="0" algn="l" rtl="0">
+              <a:spcBef>
+                <a:spcPts val="0"/>
+              </a:spcBef>
+              <a:spcAft>
+                <a:spcPts val="0"/>
+              </a:spcAft>
+              <a:buClr>
+                <a:schemeClr val="dk1"/>
+              </a:buClr>
+              <a:buSzPts val="1100"/>
+              <a:buFont typeface="Arial"/>
+              <a:buNone/>
+            </a:pPr>
+            <a:r>
+              <a:rPr lang="en">
+                <a:solidFill>
+                  <a:srgbClr val="111111"/>
+                </a:solidFill>
+                <a:highlight>
+                  <a:schemeClr val="lt1"/>
+                </a:highlight>
+              </a:rPr>
+              <a:t>Steeltoe’s configuration supports both reading the config values directly, as well as Dependency Injection with the Options framework</a:t>
+            </a:r>
+            <a:endParaRPr>
+              <a:solidFill>
+                <a:srgbClr val="111111"/>
+              </a:solidFill>
+              <a:highlight>
+                <a:schemeClr val="lt1"/>
+              </a:highlight>
+            </a:endParaRPr>
+          </a:p>
+          <a:p>
+            <a:pPr marL="0" lvl="0" indent="0" algn="l" rtl="0">
+              <a:spcBef>
+                <a:spcPts val="0"/>
+              </a:spcBef>
+              <a:spcAft>
+                <a:spcPts val="0"/>
+              </a:spcAft>
+              <a:buClr>
+                <a:schemeClr val="dk1"/>
+              </a:buClr>
+              <a:buSzPts val="1100"/>
+              <a:buFont typeface="Arial"/>
+              <a:buNone/>
+            </a:pPr>
+            <a:endParaRPr>
+              <a:solidFill>
+                <a:srgbClr val="111111"/>
+              </a:solidFill>
+              <a:highlight>
+                <a:schemeClr val="lt1"/>
+              </a:highlight>
+            </a:endParaRPr>
+          </a:p>
+          <a:p>
+            <a:pPr marL="0" lvl="0" indent="0" algn="l" rtl="0">
+              <a:spcBef>
+                <a:spcPts val="0"/>
+              </a:spcBef>
+              <a:spcAft>
+                <a:spcPts val="0"/>
+              </a:spcAft>
+              <a:buNone/>
+            </a:pPr>
+            <a:endParaRPr>
+              <a:solidFill>
+                <a:srgbClr val="111111"/>
+              </a:solidFill>
+              <a:highlight>
+                <a:srgbClr val="FFFFFF"/>
+              </a:highlight>
+            </a:endParaRPr>
           </a:p>
         </p:txBody>
       </p:sp>
@@ -916,707 +1512,6 @@
 </file>
 
 <file path=ppt/notesSlides/notesSlide11.xml><?xml version="1.0" encoding="utf-8"?>
-<p:notes xmlns:a="http://schemas.openxmlformats.org/drawingml/2006/main" xmlns:r="http://schemas.openxmlformats.org/officeDocument/2006/relationships" xmlns:p="http://schemas.openxmlformats.org/presentationml/2006/main" showMasterSp="0" showMasterPhAnim="0">
-  <p:cSld>
-    <p:spTree>
-      <p:nvGrpSpPr>
-        <p:cNvPr id="1" name="Shape 235"/>
-        <p:cNvGrpSpPr/>
-        <p:nvPr/>
-      </p:nvGrpSpPr>
-      <p:grpSpPr>
-        <a:xfrm>
-          <a:off x="0" y="0"/>
-          <a:ext cx="0" cy="0"/>
-          <a:chOff x="0" y="0"/>
-          <a:chExt cx="0" cy="0"/>
-        </a:xfrm>
-      </p:grpSpPr>
-      <p:sp>
-        <p:nvSpPr>
-          <p:cNvPr id="236" name="Google Shape;236;g1d6e10110d_0_143:notes"/>
-          <p:cNvSpPr>
-            <a:spLocks noGrp="1" noRot="1" noChangeAspect="1"/>
-          </p:cNvSpPr>
-          <p:nvPr>
-            <p:ph type="sldImg" idx="2"/>
-          </p:nvPr>
-        </p:nvSpPr>
-        <p:spPr>
-          <a:xfrm>
-            <a:off x="381000" y="685800"/>
-            <a:ext cx="6096000" cy="3429000"/>
-          </a:xfrm>
-          <a:custGeom>
-            <a:avLst/>
-            <a:gdLst/>
-            <a:ahLst/>
-            <a:cxnLst/>
-            <a:rect l="l" t="t" r="r" b="b"/>
-            <a:pathLst>
-              <a:path w="120000" h="120000" extrusionOk="0">
-                <a:moveTo>
-                  <a:pt x="0" y="0"/>
-                </a:moveTo>
-                <a:lnTo>
-                  <a:pt x="120000" y="0"/>
-                </a:lnTo>
-                <a:lnTo>
-                  <a:pt x="120000" y="120000"/>
-                </a:lnTo>
-                <a:lnTo>
-                  <a:pt x="0" y="120000"/>
-                </a:lnTo>
-                <a:close/>
-              </a:path>
-            </a:pathLst>
-          </a:custGeom>
-        </p:spPr>
-      </p:sp>
-      <p:sp>
-        <p:nvSpPr>
-          <p:cNvPr id="237" name="Google Shape;237;g1d6e10110d_0_143:notes"/>
-          <p:cNvSpPr txBox="1">
-            <a:spLocks noGrp="1"/>
-          </p:cNvSpPr>
-          <p:nvPr>
-            <p:ph type="body" idx="1"/>
-          </p:nvPr>
-        </p:nvSpPr>
-        <p:spPr>
-          <a:xfrm>
-            <a:off x="685800" y="4343400"/>
-            <a:ext cx="5486400" cy="4114800"/>
-          </a:xfrm>
-          <a:prstGeom prst="rect">
-            <a:avLst/>
-          </a:prstGeom>
-        </p:spPr>
-        <p:txBody>
-          <a:bodyPr spcFirstLastPara="1" wrap="square" lIns="91425" tIns="91425" rIns="91425" bIns="91425" anchor="t" anchorCtr="0">
-            <a:noAutofit/>
-          </a:bodyPr>
-          <a:lstStyle/>
-          <a:p>
-            <a:pPr marL="0" lvl="0" indent="0" algn="l" rtl="0">
-              <a:spcBef>
-                <a:spcPts val="0"/>
-              </a:spcBef>
-              <a:spcAft>
-                <a:spcPts val="0"/>
-              </a:spcAft>
-              <a:buClr>
-                <a:schemeClr val="dk1"/>
-              </a:buClr>
-              <a:buSzPts val="1100"/>
-              <a:buFont typeface="Arial"/>
-              <a:buNone/>
-            </a:pPr>
-            <a:r>
-              <a:rPr lang="en">
-                <a:solidFill>
-                  <a:srgbClr val="111111"/>
-                </a:solidFill>
-                <a:highlight>
-                  <a:schemeClr val="lt1"/>
-                </a:highlight>
-              </a:rPr>
-              <a:t>We build on the Configuration API provided by .NET which enables you to pull values from different sources using Configuration Providers. </a:t>
-            </a:r>
-            <a:endParaRPr>
-              <a:solidFill>
-                <a:srgbClr val="111111"/>
-              </a:solidFill>
-              <a:highlight>
-                <a:schemeClr val="lt1"/>
-              </a:highlight>
-            </a:endParaRPr>
-          </a:p>
-          <a:p>
-            <a:pPr marL="0" lvl="0" indent="0" algn="l" rtl="0">
-              <a:spcBef>
-                <a:spcPts val="0"/>
-              </a:spcBef>
-              <a:spcAft>
-                <a:spcPts val="0"/>
-              </a:spcAft>
-              <a:buClr>
-                <a:schemeClr val="dk1"/>
-              </a:buClr>
-              <a:buSzPts val="1100"/>
-              <a:buFont typeface="Arial"/>
-              <a:buNone/>
-            </a:pPr>
-            <a:endParaRPr>
-              <a:solidFill>
-                <a:srgbClr val="111111"/>
-              </a:solidFill>
-              <a:highlight>
-                <a:schemeClr val="lt1"/>
-              </a:highlight>
-            </a:endParaRPr>
-          </a:p>
-          <a:p>
-            <a:pPr marL="0" lvl="0" indent="0" algn="l" rtl="0">
-              <a:spcBef>
-                <a:spcPts val="0"/>
-              </a:spcBef>
-              <a:spcAft>
-                <a:spcPts val="0"/>
-              </a:spcAft>
-              <a:buClr>
-                <a:schemeClr val="dk1"/>
-              </a:buClr>
-              <a:buSzPts val="1100"/>
-              <a:buFont typeface="Arial"/>
-              <a:buNone/>
-            </a:pPr>
-            <a:r>
-              <a:rPr lang="en">
-                <a:solidFill>
-                  <a:srgbClr val="111111"/>
-                </a:solidFill>
-                <a:highlight>
-                  <a:schemeClr val="lt1"/>
-                </a:highlight>
-              </a:rPr>
-              <a:t>Each provider supports reading a set of name-value pairs from a different source location; adding them into a combined multi-level configuration dictionary.</a:t>
-            </a:r>
-            <a:endParaRPr>
-              <a:solidFill>
-                <a:srgbClr val="111111"/>
-              </a:solidFill>
-              <a:highlight>
-                <a:schemeClr val="lt1"/>
-              </a:highlight>
-            </a:endParaRPr>
-          </a:p>
-          <a:p>
-            <a:pPr marL="0" lvl="0" indent="0" algn="l" rtl="0">
-              <a:lnSpc>
-                <a:spcPct val="115000"/>
-              </a:lnSpc>
-              <a:spcBef>
-                <a:spcPts val="1100"/>
-              </a:spcBef>
-              <a:spcAft>
-                <a:spcPts val="0"/>
-              </a:spcAft>
-              <a:buClr>
-                <a:schemeClr val="dk1"/>
-              </a:buClr>
-              <a:buSzPts val="1100"/>
-              <a:buFont typeface="Arial"/>
-              <a:buNone/>
-            </a:pPr>
-            <a:r>
-              <a:rPr lang="en">
-                <a:solidFill>
-                  <a:srgbClr val="111111"/>
-                </a:solidFill>
-                <a:highlight>
-                  <a:schemeClr val="lt1"/>
-                </a:highlight>
-              </a:rPr>
-              <a:t>Out of the box, .NET supports getting configuration from:</a:t>
-            </a:r>
-            <a:endParaRPr>
-              <a:solidFill>
-                <a:srgbClr val="111111"/>
-              </a:solidFill>
-              <a:highlight>
-                <a:schemeClr val="lt1"/>
-              </a:highlight>
-            </a:endParaRPr>
-          </a:p>
-          <a:p>
-            <a:pPr marL="457200" lvl="0" indent="-298450" algn="l" rtl="0">
-              <a:lnSpc>
-                <a:spcPct val="115000"/>
-              </a:lnSpc>
-              <a:spcBef>
-                <a:spcPts val="1100"/>
-              </a:spcBef>
-              <a:spcAft>
-                <a:spcPts val="0"/>
-              </a:spcAft>
-              <a:buClr>
-                <a:srgbClr val="111111"/>
-              </a:buClr>
-              <a:buSzPts val="1100"/>
-              <a:buFont typeface="Arial"/>
-              <a:buChar char="●"/>
-            </a:pPr>
-            <a:r>
-              <a:rPr lang="en">
-                <a:solidFill>
-                  <a:srgbClr val="111111"/>
-                </a:solidFill>
-                <a:highlight>
-                  <a:schemeClr val="lt1"/>
-                </a:highlight>
-              </a:rPr>
-              <a:t>Command-line arguments</a:t>
-            </a:r>
-            <a:endParaRPr>
-              <a:solidFill>
-                <a:srgbClr val="111111"/>
-              </a:solidFill>
-              <a:highlight>
-                <a:schemeClr val="lt1"/>
-              </a:highlight>
-            </a:endParaRPr>
-          </a:p>
-          <a:p>
-            <a:pPr marL="457200" lvl="0" indent="-298450" algn="l" rtl="0">
-              <a:lnSpc>
-                <a:spcPct val="115000"/>
-              </a:lnSpc>
-              <a:spcBef>
-                <a:spcPts val="0"/>
-              </a:spcBef>
-              <a:spcAft>
-                <a:spcPts val="0"/>
-              </a:spcAft>
-              <a:buClr>
-                <a:srgbClr val="111111"/>
-              </a:buClr>
-              <a:buSzPts val="1100"/>
-              <a:buFont typeface="Arial"/>
-              <a:buChar char="●"/>
-            </a:pPr>
-            <a:r>
-              <a:rPr lang="en">
-                <a:solidFill>
-                  <a:srgbClr val="111111"/>
-                </a:solidFill>
-                <a:highlight>
-                  <a:schemeClr val="lt1"/>
-                </a:highlight>
-              </a:rPr>
-              <a:t>File sources (e.g. JSON, XML and INI)</a:t>
-            </a:r>
-            <a:endParaRPr>
-              <a:solidFill>
-                <a:srgbClr val="111111"/>
-              </a:solidFill>
-              <a:highlight>
-                <a:schemeClr val="lt1"/>
-              </a:highlight>
-            </a:endParaRPr>
-          </a:p>
-          <a:p>
-            <a:pPr marL="457200" lvl="0" indent="-298450" algn="l" rtl="0">
-              <a:lnSpc>
-                <a:spcPct val="115000"/>
-              </a:lnSpc>
-              <a:spcBef>
-                <a:spcPts val="0"/>
-              </a:spcBef>
-              <a:spcAft>
-                <a:spcPts val="0"/>
-              </a:spcAft>
-              <a:buClr>
-                <a:srgbClr val="111111"/>
-              </a:buClr>
-              <a:buSzPts val="1100"/>
-              <a:buFont typeface="Arial"/>
-              <a:buChar char="●"/>
-            </a:pPr>
-            <a:r>
-              <a:rPr lang="en">
-                <a:solidFill>
-                  <a:srgbClr val="111111"/>
-                </a:solidFill>
-                <a:highlight>
-                  <a:schemeClr val="lt1"/>
-                </a:highlight>
-              </a:rPr>
-              <a:t>Environment variables</a:t>
-            </a:r>
-            <a:endParaRPr>
-              <a:solidFill>
-                <a:srgbClr val="111111"/>
-              </a:solidFill>
-              <a:highlight>
-                <a:schemeClr val="lt1"/>
-              </a:highlight>
-            </a:endParaRPr>
-          </a:p>
-          <a:p>
-            <a:pPr marL="457200" lvl="0" indent="-298450" algn="l" rtl="0">
-              <a:lnSpc>
-                <a:spcPct val="115000"/>
-              </a:lnSpc>
-              <a:spcBef>
-                <a:spcPts val="0"/>
-              </a:spcBef>
-              <a:spcAft>
-                <a:spcPts val="0"/>
-              </a:spcAft>
-              <a:buClr>
-                <a:srgbClr val="111111"/>
-              </a:buClr>
-              <a:buSzPts val="1100"/>
-              <a:buFont typeface="Arial"/>
-              <a:buChar char="●"/>
-            </a:pPr>
-            <a:r>
-              <a:rPr lang="en">
-                <a:solidFill>
-                  <a:srgbClr val="111111"/>
-                </a:solidFill>
-                <a:highlight>
-                  <a:schemeClr val="lt1"/>
-                </a:highlight>
-              </a:rPr>
-              <a:t>Custom providers</a:t>
-            </a:r>
-            <a:endParaRPr>
-              <a:solidFill>
-                <a:srgbClr val="111111"/>
-              </a:solidFill>
-              <a:highlight>
-                <a:schemeClr val="lt1"/>
-              </a:highlight>
-            </a:endParaRPr>
-          </a:p>
-          <a:p>
-            <a:pPr marL="0" lvl="0" indent="0" algn="l" rtl="0">
-              <a:spcBef>
-                <a:spcPts val="1100"/>
-              </a:spcBef>
-              <a:spcAft>
-                <a:spcPts val="0"/>
-              </a:spcAft>
-              <a:buClr>
-                <a:schemeClr val="dk1"/>
-              </a:buClr>
-              <a:buSzPts val="1100"/>
-              <a:buFont typeface="Arial"/>
-              <a:buNone/>
-            </a:pPr>
-            <a:r>
-              <a:rPr lang="en">
-                <a:solidFill>
-                  <a:srgbClr val="111111"/>
-                </a:solidFill>
-                <a:highlight>
-                  <a:schemeClr val="lt1"/>
-                </a:highlight>
-              </a:rPr>
-              <a:t>Steeltoe adds two additional providers to that list:</a:t>
-            </a:r>
-            <a:endParaRPr>
-              <a:solidFill>
-                <a:srgbClr val="111111"/>
-              </a:solidFill>
-              <a:highlight>
-                <a:schemeClr val="lt1"/>
-              </a:highlight>
-            </a:endParaRPr>
-          </a:p>
-          <a:p>
-            <a:pPr marL="0" lvl="0" indent="0" algn="l" rtl="0">
-              <a:spcBef>
-                <a:spcPts val="0"/>
-              </a:spcBef>
-              <a:spcAft>
-                <a:spcPts val="0"/>
-              </a:spcAft>
-              <a:buClr>
-                <a:schemeClr val="dk1"/>
-              </a:buClr>
-              <a:buSzPts val="1100"/>
-              <a:buFont typeface="Arial"/>
-              <a:buNone/>
-            </a:pPr>
-            <a:endParaRPr>
-              <a:solidFill>
-                <a:srgbClr val="111111"/>
-              </a:solidFill>
-              <a:highlight>
-                <a:schemeClr val="lt1"/>
-              </a:highlight>
-            </a:endParaRPr>
-          </a:p>
-          <a:p>
-            <a:pPr marL="0" lvl="0" indent="0" algn="l" rtl="0">
-              <a:spcBef>
-                <a:spcPts val="0"/>
-              </a:spcBef>
-              <a:spcAft>
-                <a:spcPts val="0"/>
-              </a:spcAft>
-              <a:buClr>
-                <a:schemeClr val="dk1"/>
-              </a:buClr>
-              <a:buSzPts val="1100"/>
-              <a:buFont typeface="Arial"/>
-              <a:buNone/>
-            </a:pPr>
-            <a:r>
-              <a:rPr lang="en" b="1">
-                <a:solidFill>
-                  <a:srgbClr val="111111"/>
-                </a:solidFill>
-                <a:highlight>
-                  <a:schemeClr val="lt1"/>
-                </a:highlight>
-              </a:rPr>
-              <a:t>Cloud Foundry Provider</a:t>
-            </a:r>
-            <a:endParaRPr b="1">
-              <a:solidFill>
-                <a:srgbClr val="111111"/>
-              </a:solidFill>
-              <a:highlight>
-                <a:schemeClr val="lt1"/>
-              </a:highlight>
-            </a:endParaRPr>
-          </a:p>
-          <a:p>
-            <a:pPr marL="0" lvl="0" indent="0" algn="l" rtl="0">
-              <a:spcBef>
-                <a:spcPts val="0"/>
-              </a:spcBef>
-              <a:spcAft>
-                <a:spcPts val="0"/>
-              </a:spcAft>
-              <a:buClr>
-                <a:schemeClr val="dk1"/>
-              </a:buClr>
-              <a:buSzPts val="1100"/>
-              <a:buFont typeface="Arial"/>
-              <a:buNone/>
-            </a:pPr>
-            <a:r>
-              <a:rPr lang="en">
-                <a:solidFill>
-                  <a:srgbClr val="111111"/>
-                </a:solidFill>
-                <a:highlight>
-                  <a:schemeClr val="lt1"/>
-                </a:highlight>
-              </a:rPr>
-              <a:t>This provider enables the standard Cloud Foundry environment variables, VCAP_APPLICATION, VCAP_SERVICES and CF_* to be parsed and accessed as configuration data.</a:t>
-            </a:r>
-            <a:endParaRPr>
-              <a:solidFill>
-                <a:srgbClr val="111111"/>
-              </a:solidFill>
-              <a:highlight>
-                <a:schemeClr val="lt1"/>
-              </a:highlight>
-            </a:endParaRPr>
-          </a:p>
-          <a:p>
-            <a:pPr marL="0" lvl="0" indent="0" algn="l" rtl="0">
-              <a:spcBef>
-                <a:spcPts val="0"/>
-              </a:spcBef>
-              <a:spcAft>
-                <a:spcPts val="0"/>
-              </a:spcAft>
-              <a:buClr>
-                <a:schemeClr val="dk1"/>
-              </a:buClr>
-              <a:buSzPts val="1100"/>
-              <a:buFont typeface="Arial"/>
-              <a:buNone/>
-            </a:pPr>
-            <a:endParaRPr>
-              <a:solidFill>
-                <a:srgbClr val="111111"/>
-              </a:solidFill>
-              <a:highlight>
-                <a:schemeClr val="lt1"/>
-              </a:highlight>
-            </a:endParaRPr>
-          </a:p>
-          <a:p>
-            <a:pPr marL="0" lvl="0" indent="0" algn="l" rtl="0">
-              <a:spcBef>
-                <a:spcPts val="0"/>
-              </a:spcBef>
-              <a:spcAft>
-                <a:spcPts val="0"/>
-              </a:spcAft>
-              <a:buClr>
-                <a:schemeClr val="dk1"/>
-              </a:buClr>
-              <a:buSzPts val="1100"/>
-              <a:buFont typeface="Arial"/>
-              <a:buNone/>
-            </a:pPr>
-            <a:r>
-              <a:rPr lang="en" b="1">
-                <a:solidFill>
-                  <a:srgbClr val="111111"/>
-                </a:solidFill>
-                <a:highlight>
-                  <a:schemeClr val="lt1"/>
-                </a:highlight>
-              </a:rPr>
-              <a:t>Config Server Provider</a:t>
-            </a:r>
-            <a:endParaRPr b="1">
-              <a:solidFill>
-                <a:srgbClr val="111111"/>
-              </a:solidFill>
-              <a:highlight>
-                <a:schemeClr val="lt1"/>
-              </a:highlight>
-            </a:endParaRPr>
-          </a:p>
-          <a:p>
-            <a:pPr marL="0" lvl="0" indent="0" algn="l" rtl="0">
-              <a:spcBef>
-                <a:spcPts val="0"/>
-              </a:spcBef>
-              <a:spcAft>
-                <a:spcPts val="0"/>
-              </a:spcAft>
-              <a:buClr>
-                <a:schemeClr val="dk1"/>
-              </a:buClr>
-              <a:buSzPts val="1100"/>
-              <a:buFont typeface="Arial"/>
-              <a:buNone/>
-            </a:pPr>
-            <a:r>
-              <a:rPr lang="en">
-                <a:solidFill>
-                  <a:srgbClr val="111111"/>
-                </a:solidFill>
-                <a:highlight>
-                  <a:schemeClr val="lt1"/>
-                </a:highlight>
-              </a:rPr>
-              <a:t>This provider enables the Spring Cloud Config Server to be used as a source of configuration data for a .NET application.</a:t>
-            </a:r>
-            <a:endParaRPr>
-              <a:solidFill>
-                <a:srgbClr val="111111"/>
-              </a:solidFill>
-              <a:highlight>
-                <a:schemeClr val="lt1"/>
-              </a:highlight>
-            </a:endParaRPr>
-          </a:p>
-          <a:p>
-            <a:pPr marL="0" lvl="0" indent="0" algn="l" rtl="0">
-              <a:spcBef>
-                <a:spcPts val="0"/>
-              </a:spcBef>
-              <a:spcAft>
-                <a:spcPts val="0"/>
-              </a:spcAft>
-              <a:buClr>
-                <a:schemeClr val="dk1"/>
-              </a:buClr>
-              <a:buSzPts val="1100"/>
-              <a:buFont typeface="Arial"/>
-              <a:buNone/>
-            </a:pPr>
-            <a:endParaRPr>
-              <a:solidFill>
-                <a:srgbClr val="111111"/>
-              </a:solidFill>
-              <a:highlight>
-                <a:schemeClr val="lt1"/>
-              </a:highlight>
-            </a:endParaRPr>
-          </a:p>
-          <a:p>
-            <a:pPr marL="0" lvl="0" indent="0" algn="l" rtl="0">
-              <a:spcBef>
-                <a:spcPts val="0"/>
-              </a:spcBef>
-              <a:spcAft>
-                <a:spcPts val="0"/>
-              </a:spcAft>
-              <a:buClr>
-                <a:schemeClr val="dk1"/>
-              </a:buClr>
-              <a:buSzPts val="1100"/>
-              <a:buFont typeface="Arial"/>
-              <a:buNone/>
-            </a:pPr>
-            <a:r>
-              <a:rPr lang="en">
-                <a:solidFill>
-                  <a:srgbClr val="111111"/>
-                </a:solidFill>
-                <a:highlight>
-                  <a:schemeClr val="lt1"/>
-                </a:highlight>
-              </a:rPr>
-              <a:t>Steeltoe’s configuration supports both reading the config values directly, as well as Dependency Injection with the Options framework</a:t>
-            </a:r>
-            <a:endParaRPr>
-              <a:solidFill>
-                <a:srgbClr val="111111"/>
-              </a:solidFill>
-              <a:highlight>
-                <a:schemeClr val="lt1"/>
-              </a:highlight>
-            </a:endParaRPr>
-          </a:p>
-          <a:p>
-            <a:pPr marL="0" lvl="0" indent="0" algn="l" rtl="0">
-              <a:spcBef>
-                <a:spcPts val="0"/>
-              </a:spcBef>
-              <a:spcAft>
-                <a:spcPts val="0"/>
-              </a:spcAft>
-              <a:buClr>
-                <a:schemeClr val="dk1"/>
-              </a:buClr>
-              <a:buSzPts val="1100"/>
-              <a:buFont typeface="Arial"/>
-              <a:buNone/>
-            </a:pPr>
-            <a:endParaRPr>
-              <a:solidFill>
-                <a:srgbClr val="111111"/>
-              </a:solidFill>
-              <a:highlight>
-                <a:schemeClr val="lt1"/>
-              </a:highlight>
-            </a:endParaRPr>
-          </a:p>
-          <a:p>
-            <a:pPr marL="0" lvl="0" indent="0" algn="l" rtl="0">
-              <a:spcBef>
-                <a:spcPts val="0"/>
-              </a:spcBef>
-              <a:spcAft>
-                <a:spcPts val="0"/>
-              </a:spcAft>
-              <a:buNone/>
-            </a:pPr>
-            <a:endParaRPr>
-              <a:solidFill>
-                <a:srgbClr val="111111"/>
-              </a:solidFill>
-              <a:highlight>
-                <a:srgbClr val="FFFFFF"/>
-              </a:highlight>
-            </a:endParaRPr>
-          </a:p>
-        </p:txBody>
-      </p:sp>
-    </p:spTree>
-  </p:cSld>
-  <p:clrMapOvr>
-    <a:masterClrMapping/>
-  </p:clrMapOvr>
-</p:notes>
-</file>
-
-<file path=ppt/notesSlides/notesSlide12.xml><?xml version="1.0" encoding="utf-8"?>
 <p:notes xmlns:a="http://schemas.openxmlformats.org/drawingml/2006/main" xmlns:r="http://schemas.openxmlformats.org/officeDocument/2006/relationships" xmlns:p="http://schemas.openxmlformats.org/presentationml/2006/main" showMasterSp="0" showMasterPhAnim="0">
   <p:cSld>
     <p:spTree>
@@ -1805,7 +1700,7 @@
 </p:notes>
 </file>
 
-<file path=ppt/notesSlides/notesSlide13.xml><?xml version="1.0" encoding="utf-8"?>
+<file path=ppt/notesSlides/notesSlide12.xml><?xml version="1.0" encoding="utf-8"?>
 <p:notes xmlns:a="http://schemas.openxmlformats.org/drawingml/2006/main" xmlns:r="http://schemas.openxmlformats.org/officeDocument/2006/relationships" xmlns:p="http://schemas.openxmlformats.org/presentationml/2006/main" showMasterSp="0" showMasterPhAnim="0">
   <p:cSld>
     <p:spTree>
@@ -1912,7 +1807,7 @@
 </p:notes>
 </file>
 
-<file path=ppt/notesSlides/notesSlide14.xml><?xml version="1.0" encoding="utf-8"?>
+<file path=ppt/notesSlides/notesSlide13.xml><?xml version="1.0" encoding="utf-8"?>
 <p:notes xmlns:a="http://schemas.openxmlformats.org/drawingml/2006/main" xmlns:r="http://schemas.openxmlformats.org/officeDocument/2006/relationships" xmlns:p="http://schemas.openxmlformats.org/presentationml/2006/main" showMasterSp="0" showMasterPhAnim="0">
   <p:cSld>
     <p:spTree>
@@ -2076,7 +1971,7 @@
 </p:notes>
 </file>
 
-<file path=ppt/notesSlides/notesSlide15.xml><?xml version="1.0" encoding="utf-8"?>
+<file path=ppt/notesSlides/notesSlide14.xml><?xml version="1.0" encoding="utf-8"?>
 <p:notes xmlns:a="http://schemas.openxmlformats.org/drawingml/2006/main" xmlns:r="http://schemas.openxmlformats.org/officeDocument/2006/relationships" xmlns:p="http://schemas.openxmlformats.org/presentationml/2006/main" showMasterSp="0" showMasterPhAnim="0">
   <p:cSld>
     <p:spTree>
@@ -2246,7 +2141,7 @@
 </p:notes>
 </file>
 
-<file path=ppt/notesSlides/notesSlide16.xml><?xml version="1.0" encoding="utf-8"?>
+<file path=ppt/notesSlides/notesSlide15.xml><?xml version="1.0" encoding="utf-8"?>
 <p:notes xmlns:a="http://schemas.openxmlformats.org/drawingml/2006/main" xmlns:r="http://schemas.openxmlformats.org/officeDocument/2006/relationships" xmlns:p="http://schemas.openxmlformats.org/presentationml/2006/main" showMasterSp="0" showMasterPhAnim="0">
   <p:cSld>
     <p:spTree>
@@ -2354,7 +2249,7 @@
 </p:notes>
 </file>
 
-<file path=ppt/notesSlides/notesSlide17.xml><?xml version="1.0" encoding="utf-8"?>
+<file path=ppt/notesSlides/notesSlide16.xml><?xml version="1.0" encoding="utf-8"?>
 <p:notes xmlns:a="http://schemas.openxmlformats.org/drawingml/2006/main" xmlns:r="http://schemas.openxmlformats.org/officeDocument/2006/relationships" xmlns:p="http://schemas.openxmlformats.org/presentationml/2006/main" showMasterSp="0" showMasterPhAnim="0">
   <p:cSld>
     <p:spTree>
@@ -2458,7 +2353,7 @@
 </p:notes>
 </file>
 
-<file path=ppt/notesSlides/notesSlide18.xml><?xml version="1.0" encoding="utf-8"?>
+<file path=ppt/notesSlides/notesSlide17.xml><?xml version="1.0" encoding="utf-8"?>
 <p:notes xmlns:a="http://schemas.openxmlformats.org/drawingml/2006/main" xmlns:r="http://schemas.openxmlformats.org/officeDocument/2006/relationships" xmlns:p="http://schemas.openxmlformats.org/presentationml/2006/main" showMasterSp="0" showMasterPhAnim="0">
   <p:cSld>
     <p:spTree>
@@ -2566,7 +2461,7 @@
 </p:notes>
 </file>
 
-<file path=ppt/notesSlides/notesSlide19.xml><?xml version="1.0" encoding="utf-8"?>
+<file path=ppt/notesSlides/notesSlide18.xml><?xml version="1.0" encoding="utf-8"?>
 <p:notes xmlns:a="http://schemas.openxmlformats.org/drawingml/2006/main" xmlns:r="http://schemas.openxmlformats.org/officeDocument/2006/relationships" xmlns:p="http://schemas.openxmlformats.org/presentationml/2006/main" showMasterSp="0" showMasterPhAnim="0">
   <p:cSld>
     <p:spTree>
@@ -2693,239 +2588,7 @@
 </p:notes>
 </file>
 
-<file path=ppt/notesSlides/notesSlide2.xml><?xml version="1.0" encoding="utf-8"?>
-<p:notes xmlns:a="http://schemas.openxmlformats.org/drawingml/2006/main" xmlns:r="http://schemas.openxmlformats.org/officeDocument/2006/relationships" xmlns:p="http://schemas.openxmlformats.org/presentationml/2006/main" showMasterSp="0" showMasterPhAnim="0">
-  <p:cSld>
-    <p:spTree>
-      <p:nvGrpSpPr>
-        <p:cNvPr id="1" name="Shape 108"/>
-        <p:cNvGrpSpPr/>
-        <p:nvPr/>
-      </p:nvGrpSpPr>
-      <p:grpSpPr>
-        <a:xfrm>
-          <a:off x="0" y="0"/>
-          <a:ext cx="0" cy="0"/>
-          <a:chOff x="0" y="0"/>
-          <a:chExt cx="0" cy="0"/>
-        </a:xfrm>
-      </p:grpSpPr>
-      <p:sp>
-        <p:nvSpPr>
-          <p:cNvPr id="109" name="Google Shape;109;g209872fa98_0_65:notes"/>
-          <p:cNvSpPr>
-            <a:spLocks noGrp="1" noRot="1" noChangeAspect="1"/>
-          </p:cNvSpPr>
-          <p:nvPr>
-            <p:ph type="sldImg" idx="2"/>
-          </p:nvPr>
-        </p:nvSpPr>
-        <p:spPr>
-          <a:xfrm>
-            <a:off x="381000" y="685800"/>
-            <a:ext cx="6096000" cy="3429000"/>
-          </a:xfrm>
-          <a:custGeom>
-            <a:avLst/>
-            <a:gdLst/>
-            <a:ahLst/>
-            <a:cxnLst/>
-            <a:rect l="l" t="t" r="r" b="b"/>
-            <a:pathLst>
-              <a:path w="120000" h="120000" extrusionOk="0">
-                <a:moveTo>
-                  <a:pt x="0" y="0"/>
-                </a:moveTo>
-                <a:lnTo>
-                  <a:pt x="120000" y="0"/>
-                </a:lnTo>
-                <a:lnTo>
-                  <a:pt x="120000" y="120000"/>
-                </a:lnTo>
-                <a:lnTo>
-                  <a:pt x="0" y="120000"/>
-                </a:lnTo>
-                <a:close/>
-              </a:path>
-            </a:pathLst>
-          </a:custGeom>
-        </p:spPr>
-      </p:sp>
-      <p:sp>
-        <p:nvSpPr>
-          <p:cNvPr id="110" name="Google Shape;110;g209872fa98_0_65:notes"/>
-          <p:cNvSpPr txBox="1">
-            <a:spLocks noGrp="1"/>
-          </p:cNvSpPr>
-          <p:nvPr>
-            <p:ph type="body" idx="1"/>
-          </p:nvPr>
-        </p:nvSpPr>
-        <p:spPr>
-          <a:xfrm>
-            <a:off x="685800" y="4343400"/>
-            <a:ext cx="5486400" cy="4114800"/>
-          </a:xfrm>
-          <a:prstGeom prst="rect">
-            <a:avLst/>
-          </a:prstGeom>
-        </p:spPr>
-        <p:txBody>
-          <a:bodyPr spcFirstLastPara="1" wrap="square" lIns="91425" tIns="91425" rIns="91425" bIns="91425" anchor="t" anchorCtr="0">
-            <a:noAutofit/>
-          </a:bodyPr>
-          <a:lstStyle/>
-          <a:p>
-            <a:pPr marL="0" lvl="0" indent="0" algn="l" rtl="0">
-              <a:spcBef>
-                <a:spcPts val="0"/>
-              </a:spcBef>
-              <a:spcAft>
-                <a:spcPts val="0"/>
-              </a:spcAft>
-              <a:buClr>
-                <a:schemeClr val="dk1"/>
-              </a:buClr>
-              <a:buFont typeface="Arial"/>
-              <a:buNone/>
-            </a:pPr>
-            <a:r>
-              <a:rPr lang="en" sz="1200">
-                <a:solidFill>
-                  <a:schemeClr val="dk1"/>
-                </a:solidFill>
-                <a:latin typeface="Calibri"/>
-                <a:ea typeface="Calibri"/>
-                <a:cs typeface="Calibri"/>
-                <a:sym typeface="Calibri"/>
-              </a:rPr>
-              <a:t>Pivotal founder and chairman of the board Paul Maritz famously said that the Cloud isn’t about where computing is done, but rather how it’s done.  </a:t>
-            </a:r>
-            <a:endParaRPr sz="1400">
-              <a:solidFill>
-                <a:schemeClr val="dk1"/>
-              </a:solidFill>
-            </a:endParaRPr>
-          </a:p>
-          <a:p>
-            <a:pPr marL="0" lvl="0" indent="0" algn="l" rtl="0">
-              <a:spcBef>
-                <a:spcPts val="0"/>
-              </a:spcBef>
-              <a:spcAft>
-                <a:spcPts val="0"/>
-              </a:spcAft>
-              <a:buClr>
-                <a:schemeClr val="dk1"/>
-              </a:buClr>
-              <a:buFont typeface="Arial"/>
-              <a:buNone/>
-            </a:pPr>
-            <a:r>
-              <a:rPr lang="en" sz="1200">
-                <a:solidFill>
-                  <a:schemeClr val="dk1"/>
-                </a:solidFill>
-                <a:latin typeface="Calibri"/>
-                <a:ea typeface="Calibri"/>
-                <a:cs typeface="Calibri"/>
-                <a:sym typeface="Calibri"/>
-              </a:rPr>
-              <a:t>In other words, the value you get from moving existing IT workloads off-premise, to the cloud, </a:t>
-            </a:r>
-            <a:endParaRPr sz="1400">
-              <a:solidFill>
-                <a:schemeClr val="dk1"/>
-              </a:solidFill>
-            </a:endParaRPr>
-          </a:p>
-          <a:p>
-            <a:pPr marL="0" lvl="0" indent="0" algn="l" rtl="0">
-              <a:spcBef>
-                <a:spcPts val="0"/>
-              </a:spcBef>
-              <a:spcAft>
-                <a:spcPts val="0"/>
-              </a:spcAft>
-              <a:buClr>
-                <a:schemeClr val="dk1"/>
-              </a:buClr>
-              <a:buFont typeface="Arial"/>
-              <a:buNone/>
-            </a:pPr>
-            <a:r>
-              <a:rPr lang="en" sz="1200">
-                <a:solidFill>
-                  <a:schemeClr val="dk1"/>
-                </a:solidFill>
-                <a:latin typeface="Calibri"/>
-                <a:ea typeface="Calibri"/>
-                <a:cs typeface="Calibri"/>
-                <a:sym typeface="Calibri"/>
-              </a:rPr>
-              <a:t>pales in comparison to the value you can unlock by doing new things that the cloud makes possible, </a:t>
-            </a:r>
-            <a:endParaRPr sz="1400">
-              <a:solidFill>
-                <a:schemeClr val="dk1"/>
-              </a:solidFill>
-            </a:endParaRPr>
-          </a:p>
-          <a:p>
-            <a:pPr marL="0" lvl="0" indent="0" algn="l" rtl="0">
-              <a:spcBef>
-                <a:spcPts val="0"/>
-              </a:spcBef>
-              <a:spcAft>
-                <a:spcPts val="0"/>
-              </a:spcAft>
-              <a:buClr>
-                <a:schemeClr val="dk1"/>
-              </a:buClr>
-              <a:buFont typeface="Arial"/>
-              <a:buNone/>
-            </a:pPr>
-            <a:r>
-              <a:rPr lang="en" sz="1200">
-                <a:solidFill>
-                  <a:schemeClr val="dk1"/>
-                </a:solidFill>
-                <a:latin typeface="Calibri"/>
-                <a:ea typeface="Calibri"/>
-                <a:cs typeface="Calibri"/>
-                <a:sym typeface="Calibri"/>
-              </a:rPr>
-              <a:t>things that were never possible before with legacy technologies.</a:t>
-            </a:r>
-            <a:endParaRPr>
-              <a:solidFill>
-                <a:schemeClr val="dk1"/>
-              </a:solidFill>
-            </a:endParaRPr>
-          </a:p>
-          <a:p>
-            <a:pPr marL="0" lvl="0" indent="0" algn="l" rtl="0">
-              <a:spcBef>
-                <a:spcPts val="0"/>
-              </a:spcBef>
-              <a:spcAft>
-                <a:spcPts val="0"/>
-              </a:spcAft>
-              <a:buNone/>
-            </a:pPr>
-            <a:endParaRPr/>
-          </a:p>
-        </p:txBody>
-      </p:sp>
-    </p:spTree>
-  </p:cSld>
-  <p:clrMapOvr>
-    <a:masterClrMapping/>
-  </p:clrMapOvr>
-</p:notes>
-</file>
-
-<file path=ppt/notesSlides/notesSlide20.xml><?xml version="1.0" encoding="utf-8"?>
+<file path=ppt/notesSlides/notesSlide19.xml><?xml version="1.0" encoding="utf-8"?>
 <p:notes xmlns:a="http://schemas.openxmlformats.org/drawingml/2006/main" xmlns:r="http://schemas.openxmlformats.org/officeDocument/2006/relationships" xmlns:p="http://schemas.openxmlformats.org/presentationml/2006/main" showMasterSp="0" showMasterPhAnim="0">
   <p:cSld>
     <p:spTree>
@@ -3029,7 +2692,7 @@
 </p:notes>
 </file>
 
-<file path=ppt/notesSlides/notesSlide3.xml><?xml version="1.0" encoding="utf-8"?>
+<file path=ppt/notesSlides/notesSlide2.xml><?xml version="1.0" encoding="utf-8"?>
 <p:notes xmlns:a="http://schemas.openxmlformats.org/drawingml/2006/main" xmlns:r="http://schemas.openxmlformats.org/officeDocument/2006/relationships" xmlns:p="http://schemas.openxmlformats.org/presentationml/2006/main" showMasterSp="0" showMasterPhAnim="0">
   <p:cSld>
     <p:spTree>
@@ -3257,7 +2920,7 @@
 </p:notes>
 </file>
 
-<file path=ppt/notesSlides/notesSlide4.xml><?xml version="1.0" encoding="utf-8"?>
+<file path=ppt/notesSlides/notesSlide3.xml><?xml version="1.0" encoding="utf-8"?>
 <p:notes xmlns:a="http://schemas.openxmlformats.org/drawingml/2006/main" xmlns:r="http://schemas.openxmlformats.org/officeDocument/2006/relationships" xmlns:p="http://schemas.openxmlformats.org/presentationml/2006/main" showMasterSp="0" showMasterPhAnim="0">
   <p:cSld>
     <p:spTree>
@@ -3622,7 +3285,7 @@
 </p:notes>
 </file>
 
-<file path=ppt/notesSlides/notesSlide5.xml><?xml version="1.0" encoding="utf-8"?>
+<file path=ppt/notesSlides/notesSlide4.xml><?xml version="1.0" encoding="utf-8"?>
 <p:notes xmlns:a="http://schemas.openxmlformats.org/drawingml/2006/main" xmlns:r="http://schemas.openxmlformats.org/officeDocument/2006/relationships" xmlns:p="http://schemas.openxmlformats.org/presentationml/2006/main" showMasterSp="0" showMasterPhAnim="0">
   <p:cSld>
     <p:spTree>
@@ -3838,7 +3501,7 @@
 </p:notes>
 </file>
 
-<file path=ppt/notesSlides/notesSlide6.xml><?xml version="1.0" encoding="utf-8"?>
+<file path=ppt/notesSlides/notesSlide5.xml><?xml version="1.0" encoding="utf-8"?>
 <p:notes xmlns:a="http://schemas.openxmlformats.org/drawingml/2006/main" xmlns:r="http://schemas.openxmlformats.org/officeDocument/2006/relationships" xmlns:p="http://schemas.openxmlformats.org/presentationml/2006/main" showMasterSp="0" showMasterPhAnim="0">
   <p:cSld>
     <p:spTree>
@@ -4002,7 +3665,7 @@
 </p:notes>
 </file>
 
-<file path=ppt/notesSlides/notesSlide7.xml><?xml version="1.0" encoding="utf-8"?>
+<file path=ppt/notesSlides/notesSlide6.xml><?xml version="1.0" encoding="utf-8"?>
 <p:notes xmlns:a="http://schemas.openxmlformats.org/drawingml/2006/main" xmlns:r="http://schemas.openxmlformats.org/officeDocument/2006/relationships" xmlns:p="http://schemas.openxmlformats.org/presentationml/2006/main" showMasterSp="0" showMasterPhAnim="0">
   <p:cSld>
     <p:spTree>
@@ -4306,7 +3969,7 @@
 </p:notes>
 </file>
 
-<file path=ppt/notesSlides/notesSlide8.xml><?xml version="1.0" encoding="utf-8"?>
+<file path=ppt/notesSlides/notesSlide7.xml><?xml version="1.0" encoding="utf-8"?>
 <p:notes xmlns:a="http://schemas.openxmlformats.org/drawingml/2006/main" xmlns:r="http://schemas.openxmlformats.org/officeDocument/2006/relationships" xmlns:p="http://schemas.openxmlformats.org/presentationml/2006/main" showMasterSp="0" showMasterPhAnim="0">
   <p:cSld>
     <p:spTree>
@@ -4565,7 +4228,7 @@
 </p:notes>
 </file>
 
-<file path=ppt/notesSlides/notesSlide9.xml><?xml version="1.0" encoding="utf-8"?>
+<file path=ppt/notesSlides/notesSlide8.xml><?xml version="1.0" encoding="utf-8"?>
 <p:notes xmlns:a="http://schemas.openxmlformats.org/drawingml/2006/main" xmlns:r="http://schemas.openxmlformats.org/officeDocument/2006/relationships" xmlns:p="http://schemas.openxmlformats.org/presentationml/2006/main" showMasterSp="0" showMasterPhAnim="0">
   <p:cSld>
     <p:spTree>
@@ -4739,6 +4402,110 @@
                 <a:schemeClr val="dk1"/>
               </a:solidFill>
             </a:endParaRPr>
+          </a:p>
+        </p:txBody>
+      </p:sp>
+    </p:spTree>
+  </p:cSld>
+  <p:clrMapOvr>
+    <a:masterClrMapping/>
+  </p:clrMapOvr>
+</p:notes>
+</file>
+
+<file path=ppt/notesSlides/notesSlide9.xml><?xml version="1.0" encoding="utf-8"?>
+<p:notes xmlns:a="http://schemas.openxmlformats.org/drawingml/2006/main" xmlns:r="http://schemas.openxmlformats.org/officeDocument/2006/relationships" xmlns:p="http://schemas.openxmlformats.org/presentationml/2006/main" showMasterSp="0" showMasterPhAnim="0">
+  <p:cSld>
+    <p:spTree>
+      <p:nvGrpSpPr>
+        <p:cNvPr id="1" name="Shape 226"/>
+        <p:cNvGrpSpPr/>
+        <p:nvPr/>
+      </p:nvGrpSpPr>
+      <p:grpSpPr>
+        <a:xfrm>
+          <a:off x="0" y="0"/>
+          <a:ext cx="0" cy="0"/>
+          <a:chOff x="0" y="0"/>
+          <a:chExt cx="0" cy="0"/>
+        </a:xfrm>
+      </p:grpSpPr>
+      <p:sp>
+        <p:nvSpPr>
+          <p:cNvPr id="227" name="Google Shape;227;g1d6e10110d_0_338:notes"/>
+          <p:cNvSpPr>
+            <a:spLocks noGrp="1" noRot="1" noChangeAspect="1"/>
+          </p:cNvSpPr>
+          <p:nvPr>
+            <p:ph type="sldImg" idx="2"/>
+          </p:nvPr>
+        </p:nvSpPr>
+        <p:spPr>
+          <a:xfrm>
+            <a:off x="381000" y="685800"/>
+            <a:ext cx="6096000" cy="3429000"/>
+          </a:xfrm>
+          <a:custGeom>
+            <a:avLst/>
+            <a:gdLst/>
+            <a:ahLst/>
+            <a:cxnLst/>
+            <a:rect l="l" t="t" r="r" b="b"/>
+            <a:pathLst>
+              <a:path w="120000" h="120000" extrusionOk="0">
+                <a:moveTo>
+                  <a:pt x="0" y="0"/>
+                </a:moveTo>
+                <a:lnTo>
+                  <a:pt x="120000" y="0"/>
+                </a:lnTo>
+                <a:lnTo>
+                  <a:pt x="120000" y="120000"/>
+                </a:lnTo>
+                <a:lnTo>
+                  <a:pt x="0" y="120000"/>
+                </a:lnTo>
+                <a:close/>
+              </a:path>
+            </a:pathLst>
+          </a:custGeom>
+        </p:spPr>
+      </p:sp>
+      <p:sp>
+        <p:nvSpPr>
+          <p:cNvPr id="228" name="Google Shape;228;g1d6e10110d_0_338:notes"/>
+          <p:cNvSpPr txBox="1">
+            <a:spLocks noGrp="1"/>
+          </p:cNvSpPr>
+          <p:nvPr>
+            <p:ph type="body" idx="1"/>
+          </p:nvPr>
+        </p:nvSpPr>
+        <p:spPr>
+          <a:xfrm>
+            <a:off x="685800" y="4343400"/>
+            <a:ext cx="5486400" cy="4114800"/>
+          </a:xfrm>
+          <a:prstGeom prst="rect">
+            <a:avLst/>
+          </a:prstGeom>
+        </p:spPr>
+        <p:txBody>
+          <a:bodyPr spcFirstLastPara="1" wrap="square" lIns="91425" tIns="91425" rIns="91425" bIns="91425" anchor="t" anchorCtr="0">
+            <a:noAutofit/>
+          </a:bodyPr>
+          <a:lstStyle/>
+          <a:p>
+            <a:pPr marL="0" lvl="0" indent="0" algn="l" rtl="0">
+              <a:spcBef>
+                <a:spcPts val="0"/>
+              </a:spcBef>
+              <a:spcAft>
+                <a:spcPts val="0"/>
+              </a:spcAft>
+              <a:buNone/>
+            </a:pPr>
+            <a:endParaRPr/>
           </a:p>
         </p:txBody>
       </p:sp>
@@ -9734,206 +9501,6 @@
   <p:cSld>
     <p:spTree>
       <p:nvGrpSpPr>
-        <p:cNvPr id="1" name="Shape 229"/>
-        <p:cNvGrpSpPr/>
-        <p:nvPr/>
-      </p:nvGrpSpPr>
-      <p:grpSpPr>
-        <a:xfrm>
-          <a:off x="0" y="0"/>
-          <a:ext cx="0" cy="0"/>
-          <a:chOff x="0" y="0"/>
-          <a:chExt cx="0" cy="0"/>
-        </a:xfrm>
-      </p:grpSpPr>
-      <p:pic>
-        <p:nvPicPr>
-          <p:cNvPr id="230" name="Google Shape;230;p26"/>
-          <p:cNvPicPr preferRelativeResize="0"/>
-          <p:nvPr/>
-        </p:nvPicPr>
-        <p:blipFill rotWithShape="1">
-          <a:blip r:embed="rId3">
-            <a:alphaModFix amt="60000"/>
-          </a:blip>
-          <a:srcRect l="15769" t="16491" r="29496" b="22832"/>
-          <a:stretch/>
-        </p:blipFill>
-        <p:spPr>
-          <a:xfrm>
-            <a:off x="4504350" y="0"/>
-            <a:ext cx="4639650" cy="5143500"/>
-          </a:xfrm>
-          <a:prstGeom prst="rect">
-            <a:avLst/>
-          </a:prstGeom>
-          <a:noFill/>
-          <a:ln>
-            <a:noFill/>
-          </a:ln>
-        </p:spPr>
-      </p:pic>
-      <p:sp>
-        <p:nvSpPr>
-          <p:cNvPr id="231" name="Google Shape;231;p26"/>
-          <p:cNvSpPr txBox="1">
-            <a:spLocks noGrp="1"/>
-          </p:cNvSpPr>
-          <p:nvPr>
-            <p:ph type="ctrTitle"/>
-          </p:nvPr>
-        </p:nvSpPr>
-        <p:spPr>
-          <a:xfrm>
-            <a:off x="788725" y="2129075"/>
-            <a:ext cx="7627200" cy="1234200"/>
-          </a:xfrm>
-          <a:prstGeom prst="rect">
-            <a:avLst/>
-          </a:prstGeom>
-        </p:spPr>
-        <p:txBody>
-          <a:bodyPr spcFirstLastPara="1" wrap="square" lIns="91425" tIns="91425" rIns="91425" bIns="91425" anchor="b" anchorCtr="0">
-            <a:noAutofit/>
-          </a:bodyPr>
-          <a:lstStyle/>
-          <a:p>
-            <a:pPr marL="0" lvl="0" indent="0" algn="l" rtl="0">
-              <a:spcBef>
-                <a:spcPts val="0"/>
-              </a:spcBef>
-              <a:spcAft>
-                <a:spcPts val="0"/>
-              </a:spcAft>
-              <a:buNone/>
-            </a:pPr>
-            <a:r>
-              <a:rPr lang="en" sz="3600">
-                <a:solidFill>
-                  <a:srgbClr val="073763"/>
-                </a:solidFill>
-              </a:rPr>
-              <a:t>What’s inside the box?</a:t>
-            </a:r>
-            <a:endParaRPr sz="3600">
-              <a:solidFill>
-                <a:srgbClr val="073763"/>
-              </a:solidFill>
-            </a:endParaRPr>
-          </a:p>
-        </p:txBody>
-      </p:sp>
-      <p:sp>
-        <p:nvSpPr>
-          <p:cNvPr id="232" name="Google Shape;232;p26"/>
-          <p:cNvSpPr txBox="1"/>
-          <p:nvPr/>
-        </p:nvSpPr>
-        <p:spPr>
-          <a:xfrm>
-            <a:off x="830000" y="3282450"/>
-            <a:ext cx="8108400" cy="524400"/>
-          </a:xfrm>
-          <a:prstGeom prst="rect">
-            <a:avLst/>
-          </a:prstGeom>
-          <a:noFill/>
-          <a:ln>
-            <a:noFill/>
-          </a:ln>
-        </p:spPr>
-        <p:txBody>
-          <a:bodyPr spcFirstLastPara="1" wrap="square" lIns="91425" tIns="91425" rIns="91425" bIns="91425" anchor="t" anchorCtr="0">
-            <a:noAutofit/>
-          </a:bodyPr>
-          <a:lstStyle/>
-          <a:p>
-            <a:pPr marL="0" lvl="0" indent="0" algn="l" rtl="0">
-              <a:spcBef>
-                <a:spcPts val="0"/>
-              </a:spcBef>
-              <a:spcAft>
-                <a:spcPts val="0"/>
-              </a:spcAft>
-              <a:buNone/>
-            </a:pPr>
-            <a:endParaRPr sz="1800">
-              <a:solidFill>
-                <a:srgbClr val="3D85C6"/>
-              </a:solidFill>
-            </a:endParaRPr>
-          </a:p>
-        </p:txBody>
-      </p:sp>
-      <p:pic>
-        <p:nvPicPr>
-          <p:cNvPr id="233" name="Google Shape;233;p26"/>
-          <p:cNvPicPr preferRelativeResize="0"/>
-          <p:nvPr/>
-        </p:nvPicPr>
-        <p:blipFill>
-          <a:blip r:embed="rId4">
-            <a:alphaModFix/>
-          </a:blip>
-          <a:stretch>
-            <a:fillRect/>
-          </a:stretch>
-        </p:blipFill>
-        <p:spPr>
-          <a:xfrm>
-            <a:off x="8179914" y="4771600"/>
-            <a:ext cx="897087" cy="371225"/>
-          </a:xfrm>
-          <a:prstGeom prst="rect">
-            <a:avLst/>
-          </a:prstGeom>
-          <a:noFill/>
-          <a:ln>
-            <a:noFill/>
-          </a:ln>
-        </p:spPr>
-      </p:pic>
-      <p:pic>
-        <p:nvPicPr>
-          <p:cNvPr id="234" name="Google Shape;234;p26"/>
-          <p:cNvPicPr preferRelativeResize="0"/>
-          <p:nvPr/>
-        </p:nvPicPr>
-        <p:blipFill>
-          <a:blip r:embed="rId5">
-            <a:alphaModFix/>
-          </a:blip>
-          <a:stretch>
-            <a:fillRect/>
-          </a:stretch>
-        </p:blipFill>
-        <p:spPr>
-          <a:xfrm>
-            <a:off x="167325" y="4411827"/>
-            <a:ext cx="1353975" cy="676988"/>
-          </a:xfrm>
-          <a:prstGeom prst="rect">
-            <a:avLst/>
-          </a:prstGeom>
-          <a:noFill/>
-          <a:ln>
-            <a:noFill/>
-          </a:ln>
-        </p:spPr>
-      </p:pic>
-    </p:spTree>
-  </p:cSld>
-  <p:clrMapOvr>
-    <a:masterClrMapping/>
-  </p:clrMapOvr>
-</p:sld>
-</file>
-
-<file path=ppt/slides/slide11.xml><?xml version="1.0" encoding="utf-8"?>
-<p:sld xmlns:a="http://schemas.openxmlformats.org/drawingml/2006/main" xmlns:r="http://schemas.openxmlformats.org/officeDocument/2006/relationships" xmlns:p="http://schemas.openxmlformats.org/presentationml/2006/main">
-  <p:cSld>
-    <p:spTree>
-      <p:nvGrpSpPr>
         <p:cNvPr id="1" name="Shape 238"/>
         <p:cNvGrpSpPr/>
         <p:nvPr/>
@@ -10301,7 +9868,7 @@
             </a:pPr>
             <a:fld id="{00000000-1234-1234-1234-123412341234}" type="slidenum">
               <a:rPr lang="en"/>
-              <a:t>11</a:t>
+              <a:t>10</a:t>
             </a:fld>
             <a:endParaRPr/>
           </a:p>
@@ -10531,7 +10098,7 @@
 </p:sld>
 </file>
 
-<file path=ppt/slides/slide12.xml><?xml version="1.0" encoding="utf-8"?>
+<file path=ppt/slides/slide11.xml><?xml version="1.0" encoding="utf-8"?>
 <p:sld xmlns:a="http://schemas.openxmlformats.org/drawingml/2006/main" xmlns:r="http://schemas.openxmlformats.org/officeDocument/2006/relationships" xmlns:p="http://schemas.openxmlformats.org/presentationml/2006/main">
   <p:cSld>
     <p:spTree>
@@ -10833,7 +10400,7 @@
             </a:pPr>
             <a:fld id="{00000000-1234-1234-1234-123412341234}" type="slidenum">
               <a:rPr lang="en"/>
-              <a:t>12</a:t>
+              <a:t>11</a:t>
             </a:fld>
             <a:endParaRPr/>
           </a:p>
@@ -11063,7 +10630,7 @@
 </p:sld>
 </file>
 
-<file path=ppt/slides/slide13.xml><?xml version="1.0" encoding="utf-8"?>
+<file path=ppt/slides/slide12.xml><?xml version="1.0" encoding="utf-8"?>
 <p:sld xmlns:a="http://schemas.openxmlformats.org/drawingml/2006/main" xmlns:r="http://schemas.openxmlformats.org/officeDocument/2006/relationships" xmlns:p="http://schemas.openxmlformats.org/presentationml/2006/main">
   <p:cSld>
     <p:spTree>
@@ -11353,7 +10920,7 @@
             </a:pPr>
             <a:fld id="{00000000-1234-1234-1234-123412341234}" type="slidenum">
               <a:rPr lang="en"/>
-              <a:t>13</a:t>
+              <a:t>12</a:t>
             </a:fld>
             <a:endParaRPr/>
           </a:p>
@@ -11611,7 +11178,7 @@
 </p:sld>
 </file>
 
-<file path=ppt/slides/slide14.xml><?xml version="1.0" encoding="utf-8"?>
+<file path=ppt/slides/slide13.xml><?xml version="1.0" encoding="utf-8"?>
 <p:sld xmlns:a="http://schemas.openxmlformats.org/drawingml/2006/main" xmlns:r="http://schemas.openxmlformats.org/officeDocument/2006/relationships" xmlns:p="http://schemas.openxmlformats.org/presentationml/2006/main">
   <p:cSld>
     <p:spTree>
@@ -12013,7 +11580,7 @@
             </a:pPr>
             <a:fld id="{00000000-1234-1234-1234-123412341234}" type="slidenum">
               <a:rPr lang="en"/>
-              <a:t>14</a:t>
+              <a:t>13</a:t>
             </a:fld>
             <a:endParaRPr/>
           </a:p>
@@ -12300,7 +11867,7 @@
 </p:sld>
 </file>
 
-<file path=ppt/slides/slide15.xml><?xml version="1.0" encoding="utf-8"?>
+<file path=ppt/slides/slide14.xml><?xml version="1.0" encoding="utf-8"?>
 <p:sld xmlns:a="http://schemas.openxmlformats.org/drawingml/2006/main" xmlns:r="http://schemas.openxmlformats.org/officeDocument/2006/relationships" xmlns:p="http://schemas.openxmlformats.org/presentationml/2006/main">
   <p:cSld>
     <p:spTree>
@@ -12700,7 +12267,7 @@
             </a:pPr>
             <a:fld id="{00000000-1234-1234-1234-123412341234}" type="slidenum">
               <a:rPr lang="en"/>
-              <a:t>15</a:t>
+              <a:t>14</a:t>
             </a:fld>
             <a:endParaRPr/>
           </a:p>
@@ -12958,7 +12525,7 @@
 </p:sld>
 </file>
 
-<file path=ppt/slides/slide16.xml><?xml version="1.0" encoding="utf-8"?>
+<file path=ppt/slides/slide15.xml><?xml version="1.0" encoding="utf-8"?>
 <p:sld xmlns:a="http://schemas.openxmlformats.org/drawingml/2006/main" xmlns:r="http://schemas.openxmlformats.org/officeDocument/2006/relationships" xmlns:p="http://schemas.openxmlformats.org/presentationml/2006/main">
   <p:cSld>
     <p:spTree>
@@ -13453,7 +13020,7 @@
             </a:pPr>
             <a:fld id="{00000000-1234-1234-1234-123412341234}" type="slidenum">
               <a:rPr lang="en"/>
-              <a:t>16</a:t>
+              <a:t>15</a:t>
             </a:fld>
             <a:endParaRPr/>
           </a:p>
@@ -13764,7 +13331,7 @@
 </p:sld>
 </file>
 
-<file path=ppt/slides/slide17.xml><?xml version="1.0" encoding="utf-8"?>
+<file path=ppt/slides/slide16.xml><?xml version="1.0" encoding="utf-8"?>
 <p:sld xmlns:a="http://schemas.openxmlformats.org/drawingml/2006/main" xmlns:r="http://schemas.openxmlformats.org/officeDocument/2006/relationships" xmlns:p="http://schemas.openxmlformats.org/presentationml/2006/main">
   <p:cSld>
     <p:spTree>
@@ -13979,7 +13546,7 @@
 </p:sld>
 </file>
 
-<file path=ppt/slides/slide18.xml><?xml version="1.0" encoding="utf-8"?>
+<file path=ppt/slides/slide17.xml><?xml version="1.0" encoding="utf-8"?>
 <p:sld xmlns:a="http://schemas.openxmlformats.org/drawingml/2006/main" xmlns:r="http://schemas.openxmlformats.org/officeDocument/2006/relationships" xmlns:p="http://schemas.openxmlformats.org/presentationml/2006/main">
   <p:cSld>
     <p:spTree>
@@ -14391,7 +13958,7 @@
             </a:pPr>
             <a:fld id="{00000000-1234-1234-1234-123412341234}" type="slidenum">
               <a:rPr lang="en"/>
-              <a:t>18</a:t>
+              <a:t>17</a:t>
             </a:fld>
             <a:endParaRPr/>
           </a:p>
@@ -14621,7 +14188,7 @@
 </p:sld>
 </file>
 
-<file path=ppt/slides/slide19.xml><?xml version="1.0" encoding="utf-8"?>
+<file path=ppt/slides/slide18.xml><?xml version="1.0" encoding="utf-8"?>
 <p:sld xmlns:a="http://schemas.openxmlformats.org/drawingml/2006/main" xmlns:r="http://schemas.openxmlformats.org/officeDocument/2006/relationships" xmlns:p="http://schemas.openxmlformats.org/presentationml/2006/main">
   <p:cSld>
     <p:spTree>
@@ -15064,7 +14631,7 @@
             </a:pPr>
             <a:fld id="{00000000-1234-1234-1234-123412341234}" type="slidenum">
               <a:rPr lang="en"/>
-              <a:t>19</a:t>
+              <a:t>18</a:t>
             </a:fld>
             <a:endParaRPr/>
           </a:p>
@@ -15294,749 +14861,7 @@
 </p:sld>
 </file>
 
-<file path=ppt/slides/slide2.xml><?xml version="1.0" encoding="utf-8"?>
-<p:sld xmlns:a="http://schemas.openxmlformats.org/drawingml/2006/main" xmlns:r="http://schemas.openxmlformats.org/officeDocument/2006/relationships" xmlns:p="http://schemas.openxmlformats.org/presentationml/2006/main">
-  <p:cSld>
-    <p:spTree>
-      <p:nvGrpSpPr>
-        <p:cNvPr id="1" name="Shape 111"/>
-        <p:cNvGrpSpPr/>
-        <p:nvPr/>
-      </p:nvGrpSpPr>
-      <p:grpSpPr>
-        <a:xfrm>
-          <a:off x="0" y="0"/>
-          <a:ext cx="0" cy="0"/>
-          <a:chOff x="0" y="0"/>
-          <a:chExt cx="0" cy="0"/>
-        </a:xfrm>
-      </p:grpSpPr>
-      <p:pic>
-        <p:nvPicPr>
-          <p:cNvPr id="112" name="Google Shape;112;p18"/>
-          <p:cNvPicPr preferRelativeResize="0"/>
-          <p:nvPr/>
-        </p:nvPicPr>
-        <p:blipFill rotWithShape="1">
-          <a:blip r:embed="rId3">
-            <a:alphaModFix amt="73000"/>
-          </a:blip>
-          <a:srcRect/>
-          <a:stretch/>
-        </p:blipFill>
-        <p:spPr>
-          <a:xfrm>
-            <a:off x="4182400" y="211600"/>
-            <a:ext cx="5009400" cy="4932000"/>
-          </a:xfrm>
-          <a:prstGeom prst="rect">
-            <a:avLst/>
-          </a:prstGeom>
-          <a:noFill/>
-          <a:ln>
-            <a:noFill/>
-          </a:ln>
-        </p:spPr>
-      </p:pic>
-      <p:sp>
-        <p:nvSpPr>
-          <p:cNvPr id="113" name="Google Shape;113;p18"/>
-          <p:cNvSpPr txBox="1">
-            <a:spLocks noGrp="1"/>
-          </p:cNvSpPr>
-          <p:nvPr>
-            <p:ph type="sldNum" idx="12"/>
-          </p:nvPr>
-        </p:nvSpPr>
-        <p:spPr>
-          <a:xfrm>
-            <a:off x="76608" y="4673142"/>
-            <a:ext cx="548700" cy="393600"/>
-          </a:xfrm>
-          <a:prstGeom prst="rect">
-            <a:avLst/>
-          </a:prstGeom>
-        </p:spPr>
-        <p:txBody>
-          <a:bodyPr spcFirstLastPara="1" wrap="square" lIns="91425" tIns="91425" rIns="91425" bIns="91425" anchor="ctr" anchorCtr="0">
-            <a:noAutofit/>
-          </a:bodyPr>
-          <a:lstStyle/>
-          <a:p>
-            <a:pPr marL="0" lvl="0" indent="0" algn="l" rtl="0">
-              <a:spcBef>
-                <a:spcPts val="0"/>
-              </a:spcBef>
-              <a:spcAft>
-                <a:spcPts val="0"/>
-              </a:spcAft>
-              <a:buNone/>
-            </a:pPr>
-            <a:fld id="{00000000-1234-1234-1234-123412341234}" type="slidenum">
-              <a:rPr lang="en"/>
-              <a:t>2</a:t>
-            </a:fld>
-            <a:endParaRPr/>
-          </a:p>
-        </p:txBody>
-      </p:sp>
-      <p:sp>
-        <p:nvSpPr>
-          <p:cNvPr id="114" name="Google Shape;114;p18"/>
-          <p:cNvSpPr/>
-          <p:nvPr/>
-        </p:nvSpPr>
-        <p:spPr>
-          <a:xfrm>
-            <a:off x="0" y="0"/>
-            <a:ext cx="9144000" cy="328200"/>
-          </a:xfrm>
-          <a:prstGeom prst="rect">
-            <a:avLst/>
-          </a:prstGeom>
-          <a:solidFill>
-            <a:srgbClr val="4272B3"/>
-          </a:solidFill>
-          <a:ln w="9525" cap="flat" cmpd="sng">
-            <a:solidFill>
-              <a:srgbClr val="4272B3"/>
-            </a:solidFill>
-            <a:prstDash val="solid"/>
-            <a:round/>
-            <a:headEnd type="none" w="sm" len="sm"/>
-            <a:tailEnd type="none" w="sm" len="sm"/>
-          </a:ln>
-        </p:spPr>
-        <p:txBody>
-          <a:bodyPr spcFirstLastPara="1" wrap="square" lIns="91425" tIns="91425" rIns="91425" bIns="91425" anchor="ctr" anchorCtr="0">
-            <a:noAutofit/>
-          </a:bodyPr>
-          <a:lstStyle/>
-          <a:p>
-            <a:pPr marL="0" lvl="0" indent="0" algn="l" rtl="0">
-              <a:spcBef>
-                <a:spcPts val="0"/>
-              </a:spcBef>
-              <a:spcAft>
-                <a:spcPts val="0"/>
-              </a:spcAft>
-              <a:buNone/>
-            </a:pPr>
-            <a:endParaRPr/>
-          </a:p>
-        </p:txBody>
-      </p:sp>
-      <p:sp>
-        <p:nvSpPr>
-          <p:cNvPr id="115" name="Google Shape;115;p18"/>
-          <p:cNvSpPr/>
-          <p:nvPr/>
-        </p:nvSpPr>
-        <p:spPr>
-          <a:xfrm>
-            <a:off x="6569400" y="0"/>
-            <a:ext cx="2574600" cy="328200"/>
-          </a:xfrm>
-          <a:prstGeom prst="rect">
-            <a:avLst/>
-          </a:prstGeom>
-          <a:solidFill>
-            <a:srgbClr val="3A68A0"/>
-          </a:solidFill>
-          <a:ln w="9525" cap="flat" cmpd="sng">
-            <a:solidFill>
-              <a:srgbClr val="3A68A0"/>
-            </a:solidFill>
-            <a:prstDash val="solid"/>
-            <a:round/>
-            <a:headEnd type="none" w="sm" len="sm"/>
-            <a:tailEnd type="none" w="sm" len="sm"/>
-          </a:ln>
-        </p:spPr>
-        <p:txBody>
-          <a:bodyPr spcFirstLastPara="1" wrap="square" lIns="91425" tIns="91425" rIns="91425" bIns="91425" anchor="ctr" anchorCtr="0">
-            <a:noAutofit/>
-          </a:bodyPr>
-          <a:lstStyle/>
-          <a:p>
-            <a:pPr marL="0" lvl="0" indent="0" algn="l" rtl="0">
-              <a:spcBef>
-                <a:spcPts val="0"/>
-              </a:spcBef>
-              <a:spcAft>
-                <a:spcPts val="0"/>
-              </a:spcAft>
-              <a:buNone/>
-            </a:pPr>
-            <a:endParaRPr/>
-          </a:p>
-        </p:txBody>
-      </p:sp>
-      <p:pic>
-        <p:nvPicPr>
-          <p:cNvPr id="116" name="Google Shape;116;p18"/>
-          <p:cNvPicPr preferRelativeResize="0"/>
-          <p:nvPr/>
-        </p:nvPicPr>
-        <p:blipFill>
-          <a:blip r:embed="rId4">
-            <a:alphaModFix/>
-          </a:blip>
-          <a:stretch>
-            <a:fillRect/>
-          </a:stretch>
-        </p:blipFill>
-        <p:spPr>
-          <a:xfrm>
-            <a:off x="8281164" y="0"/>
-            <a:ext cx="897087" cy="371225"/>
-          </a:xfrm>
-          <a:prstGeom prst="rect">
-            <a:avLst/>
-          </a:prstGeom>
-          <a:noFill/>
-          <a:ln>
-            <a:noFill/>
-          </a:ln>
-        </p:spPr>
-      </p:pic>
-      <p:sp>
-        <p:nvSpPr>
-          <p:cNvPr id="117" name="Google Shape;117;p18"/>
-          <p:cNvSpPr/>
-          <p:nvPr/>
-        </p:nvSpPr>
-        <p:spPr>
-          <a:xfrm>
-            <a:off x="7010375" y="61200"/>
-            <a:ext cx="1020900" cy="267000"/>
-          </a:xfrm>
-          <a:prstGeom prst="triangle">
-            <a:avLst>
-              <a:gd name="adj" fmla="val 49866"/>
-            </a:avLst>
-          </a:prstGeom>
-          <a:solidFill>
-            <a:srgbClr val="4272B3"/>
-          </a:solidFill>
-          <a:ln w="9525" cap="flat" cmpd="sng">
-            <a:solidFill>
-              <a:srgbClr val="4272B3"/>
-            </a:solidFill>
-            <a:prstDash val="solid"/>
-            <a:round/>
-            <a:headEnd type="none" w="sm" len="sm"/>
-            <a:tailEnd type="none" w="sm" len="sm"/>
-          </a:ln>
-        </p:spPr>
-        <p:txBody>
-          <a:bodyPr spcFirstLastPara="1" wrap="square" lIns="91425" tIns="91425" rIns="91425" bIns="91425" anchor="ctr" anchorCtr="0">
-            <a:noAutofit/>
-          </a:bodyPr>
-          <a:lstStyle/>
-          <a:p>
-            <a:pPr marL="0" lvl="0" indent="0" algn="l" rtl="0">
-              <a:spcBef>
-                <a:spcPts val="0"/>
-              </a:spcBef>
-              <a:spcAft>
-                <a:spcPts val="0"/>
-              </a:spcAft>
-              <a:buNone/>
-            </a:pPr>
-            <a:endParaRPr/>
-          </a:p>
-        </p:txBody>
-      </p:sp>
-      <p:sp>
-        <p:nvSpPr>
-          <p:cNvPr id="118" name="Google Shape;118;p18"/>
-          <p:cNvSpPr/>
-          <p:nvPr/>
-        </p:nvSpPr>
-        <p:spPr>
-          <a:xfrm rot="10800000">
-            <a:off x="5006475" y="0"/>
-            <a:ext cx="2870700" cy="328200"/>
-          </a:xfrm>
-          <a:prstGeom prst="trapezoid">
-            <a:avLst>
-              <a:gd name="adj" fmla="val 190089"/>
-            </a:avLst>
-          </a:prstGeom>
-          <a:solidFill>
-            <a:srgbClr val="122C37"/>
-          </a:solidFill>
-          <a:ln w="9525" cap="flat" cmpd="sng">
-            <a:solidFill>
-              <a:srgbClr val="122C37"/>
-            </a:solidFill>
-            <a:prstDash val="solid"/>
-            <a:round/>
-            <a:headEnd type="none" w="sm" len="sm"/>
-            <a:tailEnd type="none" w="sm" len="sm"/>
-          </a:ln>
-        </p:spPr>
-        <p:txBody>
-          <a:bodyPr spcFirstLastPara="1" wrap="square" lIns="91425" tIns="91425" rIns="91425" bIns="91425" anchor="ctr" anchorCtr="0">
-            <a:noAutofit/>
-          </a:bodyPr>
-          <a:lstStyle/>
-          <a:p>
-            <a:pPr marL="0" lvl="0" indent="0" algn="l" rtl="0">
-              <a:spcBef>
-                <a:spcPts val="0"/>
-              </a:spcBef>
-              <a:spcAft>
-                <a:spcPts val="0"/>
-              </a:spcAft>
-              <a:buNone/>
-            </a:pPr>
-            <a:endParaRPr/>
-          </a:p>
-        </p:txBody>
-      </p:sp>
-      <p:sp>
-        <p:nvSpPr>
-          <p:cNvPr id="119" name="Google Shape;119;p18"/>
-          <p:cNvSpPr txBox="1"/>
-          <p:nvPr/>
-        </p:nvSpPr>
-        <p:spPr>
-          <a:xfrm>
-            <a:off x="1285757" y="2414369"/>
-            <a:ext cx="3781200" cy="1170600"/>
-          </a:xfrm>
-          <a:prstGeom prst="rect">
-            <a:avLst/>
-          </a:prstGeom>
-          <a:noFill/>
-          <a:ln>
-            <a:noFill/>
-          </a:ln>
-        </p:spPr>
-        <p:txBody>
-          <a:bodyPr spcFirstLastPara="1" wrap="square" lIns="91425" tIns="45700" rIns="91425" bIns="45700" anchor="t" anchorCtr="0">
-            <a:noAutofit/>
-          </a:bodyPr>
-          <a:lstStyle/>
-          <a:p>
-            <a:pPr marL="0" marR="0" lvl="0" indent="0" algn="l" rtl="0">
-              <a:spcBef>
-                <a:spcPts val="0"/>
-              </a:spcBef>
-              <a:spcAft>
-                <a:spcPts val="0"/>
-              </a:spcAft>
-              <a:buNone/>
-            </a:pPr>
-            <a:r>
-              <a:rPr lang="en" sz="2800" b="1" u="none" strike="noStrike" cap="none">
-                <a:solidFill>
-                  <a:srgbClr val="3D85C6"/>
-                </a:solidFill>
-                <a:latin typeface="Arial"/>
-                <a:ea typeface="Arial"/>
-                <a:cs typeface="Arial"/>
-                <a:sym typeface="Arial"/>
-              </a:rPr>
-              <a:t>rather</a:t>
-            </a:r>
-            <a:r>
-              <a:rPr lang="en" sz="2800" b="1" u="none" strike="noStrike" cap="none">
-                <a:solidFill>
-                  <a:srgbClr val="4272B3"/>
-                </a:solidFill>
-                <a:latin typeface="Arial"/>
-                <a:ea typeface="Arial"/>
-                <a:cs typeface="Arial"/>
-                <a:sym typeface="Arial"/>
-              </a:rPr>
-              <a:t> </a:t>
-            </a:r>
-            <a:endParaRPr>
-              <a:solidFill>
-                <a:srgbClr val="4272B3"/>
-              </a:solidFill>
-            </a:endParaRPr>
-          </a:p>
-          <a:p>
-            <a:pPr marL="0" marR="0" lvl="0" indent="0" algn="l" rtl="0">
-              <a:spcBef>
-                <a:spcPts val="600"/>
-              </a:spcBef>
-              <a:spcAft>
-                <a:spcPts val="0"/>
-              </a:spcAft>
-              <a:buNone/>
-            </a:pPr>
-            <a:r>
-              <a:rPr lang="en" sz="4000" b="1" u="none" strike="noStrike" cap="none">
-                <a:solidFill>
-                  <a:srgbClr val="4272B3"/>
-                </a:solidFill>
-                <a:latin typeface="Arial"/>
-                <a:ea typeface="Arial"/>
-                <a:cs typeface="Arial"/>
-                <a:sym typeface="Arial"/>
-              </a:rPr>
-              <a:t>   </a:t>
-            </a:r>
-            <a:r>
-              <a:rPr lang="en" sz="4400" b="1" i="1" u="none" strike="noStrike" cap="none">
-                <a:solidFill>
-                  <a:srgbClr val="0B5394"/>
-                </a:solidFill>
-                <a:latin typeface="Arial"/>
-                <a:ea typeface="Arial"/>
-                <a:cs typeface="Arial"/>
-                <a:sym typeface="Arial"/>
-              </a:rPr>
-              <a:t>how</a:t>
-            </a:r>
-            <a:r>
-              <a:rPr lang="en" sz="2800" b="1" u="none" strike="noStrike" cap="none">
-                <a:solidFill>
-                  <a:srgbClr val="4272B3"/>
-                </a:solidFill>
-                <a:latin typeface="Arial"/>
-                <a:ea typeface="Arial"/>
-                <a:cs typeface="Arial"/>
-                <a:sym typeface="Arial"/>
-              </a:rPr>
-              <a:t> </a:t>
-            </a:r>
-            <a:r>
-              <a:rPr lang="en" sz="2800" b="1" u="none" strike="noStrike" cap="none">
-                <a:solidFill>
-                  <a:srgbClr val="3D85C6"/>
-                </a:solidFill>
-                <a:latin typeface="Arial"/>
-                <a:ea typeface="Arial"/>
-                <a:cs typeface="Arial"/>
-                <a:sym typeface="Arial"/>
-              </a:rPr>
-              <a:t>it’s done.</a:t>
-            </a:r>
-            <a:endParaRPr sz="2800" b="1">
-              <a:solidFill>
-                <a:srgbClr val="3D85C6"/>
-              </a:solidFill>
-              <a:latin typeface="Arial"/>
-              <a:ea typeface="Arial"/>
-              <a:cs typeface="Arial"/>
-              <a:sym typeface="Arial"/>
-            </a:endParaRPr>
-          </a:p>
-          <a:p>
-            <a:pPr marL="0" marR="0" lvl="0" indent="0" algn="l" rtl="0">
-              <a:spcBef>
-                <a:spcPts val="600"/>
-              </a:spcBef>
-              <a:spcAft>
-                <a:spcPts val="0"/>
-              </a:spcAft>
-              <a:buNone/>
-            </a:pPr>
-            <a:endParaRPr sz="2800">
-              <a:solidFill>
-                <a:srgbClr val="4272B3"/>
-              </a:solidFill>
-              <a:latin typeface="Arial"/>
-              <a:ea typeface="Arial"/>
-              <a:cs typeface="Arial"/>
-              <a:sym typeface="Arial"/>
-            </a:endParaRPr>
-          </a:p>
-        </p:txBody>
-      </p:sp>
-      <p:sp>
-        <p:nvSpPr>
-          <p:cNvPr id="120" name="Google Shape;120;p18"/>
-          <p:cNvSpPr txBox="1"/>
-          <p:nvPr/>
-        </p:nvSpPr>
-        <p:spPr>
-          <a:xfrm>
-            <a:off x="1496486" y="1232015"/>
-            <a:ext cx="3524400" cy="1161900"/>
-          </a:xfrm>
-          <a:prstGeom prst="rect">
-            <a:avLst/>
-          </a:prstGeom>
-          <a:noFill/>
-          <a:ln>
-            <a:noFill/>
-          </a:ln>
-        </p:spPr>
-        <p:txBody>
-          <a:bodyPr spcFirstLastPara="1" wrap="square" lIns="91425" tIns="45700" rIns="91425" bIns="45700" anchor="t" anchorCtr="0">
-            <a:noAutofit/>
-          </a:bodyPr>
-          <a:lstStyle/>
-          <a:p>
-            <a:pPr marL="0" marR="0" lvl="0" indent="0" algn="ctr" rtl="0">
-              <a:spcBef>
-                <a:spcPts val="0"/>
-              </a:spcBef>
-              <a:spcAft>
-                <a:spcPts val="0"/>
-              </a:spcAft>
-              <a:buNone/>
-            </a:pPr>
-            <a:r>
-              <a:rPr lang="en" sz="4000" b="1">
-                <a:solidFill>
-                  <a:srgbClr val="0B5394"/>
-                </a:solidFill>
-                <a:latin typeface="Arial"/>
-                <a:ea typeface="Arial"/>
-                <a:cs typeface="Arial"/>
-                <a:sym typeface="Arial"/>
-              </a:rPr>
-              <a:t>where</a:t>
-            </a:r>
-            <a:r>
-              <a:rPr lang="en" sz="4000" b="1">
-                <a:solidFill>
-                  <a:srgbClr val="4272B3"/>
-                </a:solidFill>
-                <a:latin typeface="Arial"/>
-                <a:ea typeface="Arial"/>
-                <a:cs typeface="Arial"/>
-                <a:sym typeface="Arial"/>
-              </a:rPr>
-              <a:t> </a:t>
-            </a:r>
-            <a:endParaRPr>
-              <a:solidFill>
-                <a:srgbClr val="4272B3"/>
-              </a:solidFill>
-            </a:endParaRPr>
-          </a:p>
-          <a:p>
-            <a:pPr marL="0" marR="0" lvl="0" indent="0" algn="ctr" rtl="0">
-              <a:spcBef>
-                <a:spcPts val="600"/>
-              </a:spcBef>
-              <a:spcAft>
-                <a:spcPts val="0"/>
-              </a:spcAft>
-              <a:buNone/>
-            </a:pPr>
-            <a:r>
-              <a:rPr lang="en" sz="2800" b="1" u="none" strike="noStrike" cap="none">
-                <a:solidFill>
-                  <a:srgbClr val="3D85C6"/>
-                </a:solidFill>
-                <a:latin typeface="Arial"/>
-                <a:ea typeface="Arial"/>
-                <a:cs typeface="Arial"/>
-                <a:sym typeface="Arial"/>
-              </a:rPr>
-              <a:t>computing is done,</a:t>
-            </a:r>
-            <a:endParaRPr sz="2800">
-              <a:solidFill>
-                <a:srgbClr val="3D85C6"/>
-              </a:solidFill>
-              <a:latin typeface="Arial"/>
-              <a:ea typeface="Arial"/>
-              <a:cs typeface="Arial"/>
-              <a:sym typeface="Arial"/>
-            </a:endParaRPr>
-          </a:p>
-        </p:txBody>
-      </p:sp>
-      <p:sp>
-        <p:nvSpPr>
-          <p:cNvPr id="121" name="Google Shape;121;p18"/>
-          <p:cNvSpPr txBox="1"/>
-          <p:nvPr/>
-        </p:nvSpPr>
-        <p:spPr>
-          <a:xfrm>
-            <a:off x="1316097" y="695300"/>
-            <a:ext cx="4263900" cy="618300"/>
-          </a:xfrm>
-          <a:prstGeom prst="rect">
-            <a:avLst/>
-          </a:prstGeom>
-          <a:noFill/>
-          <a:ln>
-            <a:noFill/>
-          </a:ln>
-        </p:spPr>
-        <p:txBody>
-          <a:bodyPr spcFirstLastPara="1" wrap="square" lIns="91425" tIns="45700" rIns="91425" bIns="45700" anchor="t" anchorCtr="0">
-            <a:noAutofit/>
-          </a:bodyPr>
-          <a:lstStyle/>
-          <a:p>
-            <a:pPr marL="0" marR="0" lvl="0" indent="0" algn="l" rtl="0">
-              <a:spcBef>
-                <a:spcPts val="0"/>
-              </a:spcBef>
-              <a:spcAft>
-                <a:spcPts val="0"/>
-              </a:spcAft>
-              <a:buNone/>
-            </a:pPr>
-            <a:r>
-              <a:rPr lang="en" sz="2800" b="1">
-                <a:solidFill>
-                  <a:srgbClr val="3D85C6"/>
-                </a:solidFill>
-                <a:latin typeface="Arial"/>
-                <a:ea typeface="Arial"/>
-                <a:cs typeface="Arial"/>
-                <a:sym typeface="Arial"/>
-              </a:rPr>
-              <a:t>the </a:t>
-            </a:r>
-            <a:r>
-              <a:rPr lang="en" sz="3200" b="1">
-                <a:solidFill>
-                  <a:srgbClr val="3D85C6"/>
-                </a:solidFill>
-                <a:latin typeface="Arial"/>
-                <a:ea typeface="Arial"/>
-                <a:cs typeface="Arial"/>
-                <a:sym typeface="Arial"/>
-              </a:rPr>
-              <a:t>Cloud</a:t>
-            </a:r>
-            <a:r>
-              <a:rPr lang="en" sz="3600" b="1">
-                <a:solidFill>
-                  <a:srgbClr val="3D85C6"/>
-                </a:solidFill>
-                <a:latin typeface="Arial"/>
-                <a:ea typeface="Arial"/>
-                <a:cs typeface="Arial"/>
-                <a:sym typeface="Arial"/>
-              </a:rPr>
-              <a:t> </a:t>
-            </a:r>
-            <a:r>
-              <a:rPr lang="en" sz="2400" b="1">
-                <a:solidFill>
-                  <a:srgbClr val="3D85C6"/>
-                </a:solidFill>
-                <a:latin typeface="Arial"/>
-                <a:ea typeface="Arial"/>
-                <a:cs typeface="Arial"/>
-                <a:sym typeface="Arial"/>
-              </a:rPr>
-              <a:t>isn’t about</a:t>
-            </a:r>
-            <a:endParaRPr sz="2400">
-              <a:solidFill>
-                <a:srgbClr val="3D85C6"/>
-              </a:solidFill>
-              <a:latin typeface="Arial"/>
-              <a:ea typeface="Arial"/>
-              <a:cs typeface="Arial"/>
-              <a:sym typeface="Arial"/>
-            </a:endParaRPr>
-          </a:p>
-        </p:txBody>
-      </p:sp>
-      <p:sp>
-        <p:nvSpPr>
-          <p:cNvPr id="122" name="Google Shape;122;p18"/>
-          <p:cNvSpPr txBox="1"/>
-          <p:nvPr/>
-        </p:nvSpPr>
-        <p:spPr>
-          <a:xfrm>
-            <a:off x="2467233" y="3835132"/>
-            <a:ext cx="4263900" cy="618300"/>
-          </a:xfrm>
-          <a:prstGeom prst="rect">
-            <a:avLst/>
-          </a:prstGeom>
-          <a:noFill/>
-          <a:ln>
-            <a:noFill/>
-          </a:ln>
-        </p:spPr>
-        <p:txBody>
-          <a:bodyPr spcFirstLastPara="1" wrap="square" lIns="91425" tIns="45700" rIns="91425" bIns="45700" anchor="t" anchorCtr="0">
-            <a:noAutofit/>
-          </a:bodyPr>
-          <a:lstStyle/>
-          <a:p>
-            <a:pPr marL="0" marR="0" lvl="0" indent="0" algn="l" rtl="0">
-              <a:spcBef>
-                <a:spcPts val="0"/>
-              </a:spcBef>
-              <a:spcAft>
-                <a:spcPts val="0"/>
-              </a:spcAft>
-              <a:buNone/>
-            </a:pPr>
-            <a:r>
-              <a:rPr lang="en" sz="2400" b="1">
-                <a:solidFill>
-                  <a:srgbClr val="0B5394"/>
-                </a:solidFill>
-                <a:latin typeface="Arial"/>
-                <a:ea typeface="Arial"/>
-                <a:cs typeface="Arial"/>
-                <a:sym typeface="Arial"/>
-              </a:rPr>
-              <a:t>– Paul Maritz</a:t>
-            </a:r>
-            <a:endParaRPr sz="2400">
-              <a:solidFill>
-                <a:srgbClr val="0B5394"/>
-              </a:solidFill>
-              <a:latin typeface="Arial"/>
-              <a:ea typeface="Arial"/>
-              <a:cs typeface="Arial"/>
-              <a:sym typeface="Arial"/>
-            </a:endParaRPr>
-          </a:p>
-        </p:txBody>
-      </p:sp>
-      <p:pic>
-        <p:nvPicPr>
-          <p:cNvPr id="123" name="Google Shape;123;p18" descr="Quote.png"/>
-          <p:cNvPicPr preferRelativeResize="0"/>
-          <p:nvPr/>
-        </p:nvPicPr>
-        <p:blipFill>
-          <a:blip r:embed="rId5">
-            <a:alphaModFix/>
-          </a:blip>
-          <a:stretch>
-            <a:fillRect/>
-          </a:stretch>
-        </p:blipFill>
-        <p:spPr>
-          <a:xfrm>
-            <a:off x="407575" y="778497"/>
-            <a:ext cx="725775" cy="685728"/>
-          </a:xfrm>
-          <a:prstGeom prst="rect">
-            <a:avLst/>
-          </a:prstGeom>
-          <a:noFill/>
-          <a:ln>
-            <a:noFill/>
-          </a:ln>
-        </p:spPr>
-      </p:pic>
-    </p:spTree>
-  </p:cSld>
-  <p:clrMapOvr>
-    <a:masterClrMapping/>
-  </p:clrMapOvr>
-</p:sld>
-</file>
-
-<file path=ppt/slides/slide20.xml><?xml version="1.0" encoding="utf-8"?>
+<file path=ppt/slides/slide19.xml><?xml version="1.0" encoding="utf-8"?>
 <p:sld xmlns:a="http://schemas.openxmlformats.org/drawingml/2006/main" xmlns:r="http://schemas.openxmlformats.org/officeDocument/2006/relationships" xmlns:p="http://schemas.openxmlformats.org/presentationml/2006/main">
   <p:cSld>
     <p:spTree>
@@ -16619,7 +15444,7 @@
             </a:pPr>
             <a:fld id="{00000000-1234-1234-1234-123412341234}" type="slidenum">
               <a:rPr lang="en"/>
-              <a:t>20</a:t>
+              <a:t>19</a:t>
             </a:fld>
             <a:endParaRPr/>
           </a:p>
@@ -16849,7 +15674,7 @@
 </p:sld>
 </file>
 
-<file path=ppt/slides/slide3.xml><?xml version="1.0" encoding="utf-8"?>
+<file path=ppt/slides/slide2.xml><?xml version="1.0" encoding="utf-8"?>
 <p:sld xmlns:a="http://schemas.openxmlformats.org/drawingml/2006/main" xmlns:r="http://schemas.openxmlformats.org/officeDocument/2006/relationships" xmlns:p="http://schemas.openxmlformats.org/presentationml/2006/main">
   <p:cSld>
     <p:spTree>
@@ -17150,7 +15975,7 @@
             </a:pPr>
             <a:fld id="{00000000-1234-1234-1234-123412341234}" type="slidenum">
               <a:rPr lang="en"/>
-              <a:t>3</a:t>
+              <a:t>2</a:t>
             </a:fld>
             <a:endParaRPr/>
           </a:p>
@@ -17433,7 +16258,7 @@
 </p:sld>
 </file>
 
-<file path=ppt/slides/slide4.xml><?xml version="1.0" encoding="utf-8"?>
+<file path=ppt/slides/slide3.xml><?xml version="1.0" encoding="utf-8"?>
 <p:sld xmlns:a="http://schemas.openxmlformats.org/drawingml/2006/main" xmlns:r="http://schemas.openxmlformats.org/officeDocument/2006/relationships" xmlns:p="http://schemas.openxmlformats.org/presentationml/2006/main">
   <p:cSld>
     <p:spTree>
@@ -17814,7 +16639,7 @@
             </a:pPr>
             <a:fld id="{00000000-1234-1234-1234-123412341234}" type="slidenum">
               <a:rPr lang="en"/>
-              <a:t>4</a:t>
+              <a:t>3</a:t>
             </a:fld>
             <a:endParaRPr/>
           </a:p>
@@ -18044,7 +16869,7 @@
 </p:sld>
 </file>
 
-<file path=ppt/slides/slide5.xml><?xml version="1.0" encoding="utf-8"?>
+<file path=ppt/slides/slide4.xml><?xml version="1.0" encoding="utf-8"?>
 <p:sld xmlns:a="http://schemas.openxmlformats.org/drawingml/2006/main" xmlns:r="http://schemas.openxmlformats.org/officeDocument/2006/relationships" xmlns:p="http://schemas.openxmlformats.org/presentationml/2006/main">
   <p:cSld>
     <p:spTree>
@@ -18425,7 +17250,7 @@
             </a:pPr>
             <a:fld id="{00000000-1234-1234-1234-123412341234}" type="slidenum">
               <a:rPr lang="en"/>
-              <a:t>5</a:t>
+              <a:t>4</a:t>
             </a:fld>
             <a:endParaRPr/>
           </a:p>
@@ -18655,7 +17480,7 @@
 </p:sld>
 </file>
 
-<file path=ppt/slides/slide6.xml><?xml version="1.0" encoding="utf-8"?>
+<file path=ppt/slides/slide5.xml><?xml version="1.0" encoding="utf-8"?>
 <p:sld xmlns:a="http://schemas.openxmlformats.org/drawingml/2006/main" xmlns:r="http://schemas.openxmlformats.org/officeDocument/2006/relationships" xmlns:p="http://schemas.openxmlformats.org/presentationml/2006/main">
   <p:cSld>
     <p:spTree>
@@ -19060,7 +17885,7 @@
             </a:pPr>
             <a:fld id="{00000000-1234-1234-1234-123412341234}" type="slidenum">
               <a:rPr lang="en"/>
-              <a:t>6</a:t>
+              <a:t>5</a:t>
             </a:fld>
             <a:endParaRPr/>
           </a:p>
@@ -19535,7 +18360,7 @@
 </p:sld>
 </file>
 
-<file path=ppt/slides/slide7.xml><?xml version="1.0" encoding="utf-8"?>
+<file path=ppt/slides/slide6.xml><?xml version="1.0" encoding="utf-8"?>
 <p:sld xmlns:a="http://schemas.openxmlformats.org/drawingml/2006/main" xmlns:r="http://schemas.openxmlformats.org/officeDocument/2006/relationships" xmlns:p="http://schemas.openxmlformats.org/presentationml/2006/main">
   <p:cSld>
     <p:spTree>
@@ -19913,7 +18738,7 @@
             </a:pPr>
             <a:fld id="{00000000-1234-1234-1234-123412341234}" type="slidenum">
               <a:rPr lang="en"/>
-              <a:t>7</a:t>
+              <a:t>6</a:t>
             </a:fld>
             <a:endParaRPr/>
           </a:p>
@@ -20177,7 +19002,7 @@
 </p:sld>
 </file>
 
-<file path=ppt/slides/slide8.xml><?xml version="1.0" encoding="utf-8"?>
+<file path=ppt/slides/slide7.xml><?xml version="1.0" encoding="utf-8"?>
 <p:sld xmlns:a="http://schemas.openxmlformats.org/drawingml/2006/main" xmlns:r="http://schemas.openxmlformats.org/officeDocument/2006/relationships" xmlns:p="http://schemas.openxmlformats.org/presentationml/2006/main">
   <p:cSld>
     <p:spTree>
@@ -20516,7 +19341,7 @@
             </a:pPr>
             <a:fld id="{00000000-1234-1234-1234-123412341234}" type="slidenum">
               <a:rPr lang="en"/>
-              <a:t>8</a:t>
+              <a:t>7</a:t>
             </a:fld>
             <a:endParaRPr/>
           </a:p>
@@ -20746,7 +19571,7 @@
 </p:sld>
 </file>
 
-<file path=ppt/slides/slide9.xml><?xml version="1.0" encoding="utf-8"?>
+<file path=ppt/slides/slide8.xml><?xml version="1.0" encoding="utf-8"?>
 <p:sld xmlns:a="http://schemas.openxmlformats.org/drawingml/2006/main" xmlns:r="http://schemas.openxmlformats.org/officeDocument/2006/relationships" xmlns:p="http://schemas.openxmlformats.org/presentationml/2006/main">
   <p:cSld>
     <p:spTree>
@@ -21111,7 +19936,7 @@
             </a:pPr>
             <a:fld id="{00000000-1234-1234-1234-123412341234}" type="slidenum">
               <a:rPr lang="en"/>
-              <a:t>9</a:t>
+              <a:t>8</a:t>
             </a:fld>
             <a:endParaRPr/>
           </a:p>
@@ -21333,6 +20158,206 @@
           </a:p>
         </p:txBody>
       </p:sp>
+    </p:spTree>
+  </p:cSld>
+  <p:clrMapOvr>
+    <a:masterClrMapping/>
+  </p:clrMapOvr>
+</p:sld>
+</file>
+
+<file path=ppt/slides/slide9.xml><?xml version="1.0" encoding="utf-8"?>
+<p:sld xmlns:a="http://schemas.openxmlformats.org/drawingml/2006/main" xmlns:r="http://schemas.openxmlformats.org/officeDocument/2006/relationships" xmlns:p="http://schemas.openxmlformats.org/presentationml/2006/main">
+  <p:cSld>
+    <p:spTree>
+      <p:nvGrpSpPr>
+        <p:cNvPr id="1" name="Shape 229"/>
+        <p:cNvGrpSpPr/>
+        <p:nvPr/>
+      </p:nvGrpSpPr>
+      <p:grpSpPr>
+        <a:xfrm>
+          <a:off x="0" y="0"/>
+          <a:ext cx="0" cy="0"/>
+          <a:chOff x="0" y="0"/>
+          <a:chExt cx="0" cy="0"/>
+        </a:xfrm>
+      </p:grpSpPr>
+      <p:pic>
+        <p:nvPicPr>
+          <p:cNvPr id="230" name="Google Shape;230;p26"/>
+          <p:cNvPicPr preferRelativeResize="0"/>
+          <p:nvPr/>
+        </p:nvPicPr>
+        <p:blipFill rotWithShape="1">
+          <a:blip r:embed="rId3">
+            <a:alphaModFix amt="60000"/>
+          </a:blip>
+          <a:srcRect l="15769" t="16491" r="29496" b="22832"/>
+          <a:stretch/>
+        </p:blipFill>
+        <p:spPr>
+          <a:xfrm>
+            <a:off x="4504350" y="0"/>
+            <a:ext cx="4639650" cy="5143500"/>
+          </a:xfrm>
+          <a:prstGeom prst="rect">
+            <a:avLst/>
+          </a:prstGeom>
+          <a:noFill/>
+          <a:ln>
+            <a:noFill/>
+          </a:ln>
+        </p:spPr>
+      </p:pic>
+      <p:sp>
+        <p:nvSpPr>
+          <p:cNvPr id="231" name="Google Shape;231;p26"/>
+          <p:cNvSpPr txBox="1">
+            <a:spLocks noGrp="1"/>
+          </p:cNvSpPr>
+          <p:nvPr>
+            <p:ph type="ctrTitle"/>
+          </p:nvPr>
+        </p:nvSpPr>
+        <p:spPr>
+          <a:xfrm>
+            <a:off x="788725" y="2129075"/>
+            <a:ext cx="7627200" cy="1234200"/>
+          </a:xfrm>
+          <a:prstGeom prst="rect">
+            <a:avLst/>
+          </a:prstGeom>
+        </p:spPr>
+        <p:txBody>
+          <a:bodyPr spcFirstLastPara="1" wrap="square" lIns="91425" tIns="91425" rIns="91425" bIns="91425" anchor="b" anchorCtr="0">
+            <a:noAutofit/>
+          </a:bodyPr>
+          <a:lstStyle/>
+          <a:p>
+            <a:pPr marL="0" lvl="0" indent="0" algn="l" rtl="0">
+              <a:spcBef>
+                <a:spcPts val="0"/>
+              </a:spcBef>
+              <a:spcAft>
+                <a:spcPts val="0"/>
+              </a:spcAft>
+              <a:buNone/>
+            </a:pPr>
+            <a:r>
+              <a:rPr lang="en" sz="3600">
+                <a:solidFill>
+                  <a:srgbClr val="073763"/>
+                </a:solidFill>
+              </a:rPr>
+              <a:t>What’s inside the box?</a:t>
+            </a:r>
+            <a:endParaRPr sz="3600">
+              <a:solidFill>
+                <a:srgbClr val="073763"/>
+              </a:solidFill>
+            </a:endParaRPr>
+          </a:p>
+        </p:txBody>
+      </p:sp>
+      <p:sp>
+        <p:nvSpPr>
+          <p:cNvPr id="232" name="Google Shape;232;p26"/>
+          <p:cNvSpPr txBox="1"/>
+          <p:nvPr/>
+        </p:nvSpPr>
+        <p:spPr>
+          <a:xfrm>
+            <a:off x="830000" y="3282450"/>
+            <a:ext cx="8108400" cy="524400"/>
+          </a:xfrm>
+          <a:prstGeom prst="rect">
+            <a:avLst/>
+          </a:prstGeom>
+          <a:noFill/>
+          <a:ln>
+            <a:noFill/>
+          </a:ln>
+        </p:spPr>
+        <p:txBody>
+          <a:bodyPr spcFirstLastPara="1" wrap="square" lIns="91425" tIns="91425" rIns="91425" bIns="91425" anchor="t" anchorCtr="0">
+            <a:noAutofit/>
+          </a:bodyPr>
+          <a:lstStyle/>
+          <a:p>
+            <a:pPr marL="0" lvl="0" indent="0" algn="l" rtl="0">
+              <a:spcBef>
+                <a:spcPts val="0"/>
+              </a:spcBef>
+              <a:spcAft>
+                <a:spcPts val="0"/>
+              </a:spcAft>
+              <a:buNone/>
+            </a:pPr>
+            <a:endParaRPr sz="1800">
+              <a:solidFill>
+                <a:srgbClr val="3D85C6"/>
+              </a:solidFill>
+            </a:endParaRPr>
+          </a:p>
+        </p:txBody>
+      </p:sp>
+      <p:pic>
+        <p:nvPicPr>
+          <p:cNvPr id="233" name="Google Shape;233;p26"/>
+          <p:cNvPicPr preferRelativeResize="0"/>
+          <p:nvPr/>
+        </p:nvPicPr>
+        <p:blipFill>
+          <a:blip r:embed="rId4">
+            <a:alphaModFix/>
+          </a:blip>
+          <a:stretch>
+            <a:fillRect/>
+          </a:stretch>
+        </p:blipFill>
+        <p:spPr>
+          <a:xfrm>
+            <a:off x="8179914" y="4771600"/>
+            <a:ext cx="897087" cy="371225"/>
+          </a:xfrm>
+          <a:prstGeom prst="rect">
+            <a:avLst/>
+          </a:prstGeom>
+          <a:noFill/>
+          <a:ln>
+            <a:noFill/>
+          </a:ln>
+        </p:spPr>
+      </p:pic>
+      <p:pic>
+        <p:nvPicPr>
+          <p:cNvPr id="234" name="Google Shape;234;p26"/>
+          <p:cNvPicPr preferRelativeResize="0"/>
+          <p:nvPr/>
+        </p:nvPicPr>
+        <p:blipFill>
+          <a:blip r:embed="rId5">
+            <a:alphaModFix/>
+          </a:blip>
+          <a:stretch>
+            <a:fillRect/>
+          </a:stretch>
+        </p:blipFill>
+        <p:spPr>
+          <a:xfrm>
+            <a:off x="167325" y="4411827"/>
+            <a:ext cx="1353975" cy="676988"/>
+          </a:xfrm>
+          <a:prstGeom prst="rect">
+            <a:avLst/>
+          </a:prstGeom>
+          <a:noFill/>
+          <a:ln>
+            <a:noFill/>
+          </a:ln>
+        </p:spPr>
+      </p:pic>
     </p:spTree>
   </p:cSld>
   <p:clrMapOvr>

</xml_diff>